<commit_message>
I think I've finished the poster, take a look and make corrections if you need to
</commit_message>
<xml_diff>
--- a/OpenNote Poster.pptx
+++ b/OpenNote Poster.pptx
@@ -288,9 +288,9 @@
           <a:p>
             <a:fld id="{A5D0B455-88A9-8143-8BEA-7DBBC3C41270}" type="datetimeFigureOut">
               <a:rPr lang="en-US" smtClean="0"/>
-              <a:t>12/7/14</a:t>
+              <a:t>12/8/14</a:t>
             </a:fld>
-            <a:endParaRPr lang="en-US"/>
+            <a:endParaRPr lang="en-US" dirty="0"/>
           </a:p>
         </p:txBody>
       </p:sp>
@@ -309,7 +309,7 @@
           <a:bodyPr/>
           <a:lstStyle/>
           <a:p>
-            <a:endParaRPr lang="en-US"/>
+            <a:endParaRPr lang="en-US" dirty="0"/>
           </a:p>
         </p:txBody>
       </p:sp>
@@ -332,7 +332,7 @@
               <a:rPr lang="en-US" smtClean="0"/>
               <a:t>‹#›</a:t>
             </a:fld>
-            <a:endParaRPr lang="en-US"/>
+            <a:endParaRPr lang="en-US" dirty="0"/>
           </a:p>
         </p:txBody>
       </p:sp>
@@ -458,9 +458,9 @@
           <a:p>
             <a:fld id="{A5D0B455-88A9-8143-8BEA-7DBBC3C41270}" type="datetimeFigureOut">
               <a:rPr lang="en-US" smtClean="0"/>
-              <a:t>12/7/14</a:t>
+              <a:t>12/8/14</a:t>
             </a:fld>
-            <a:endParaRPr lang="en-US"/>
+            <a:endParaRPr lang="en-US" dirty="0"/>
           </a:p>
         </p:txBody>
       </p:sp>
@@ -479,7 +479,7 @@
           <a:bodyPr/>
           <a:lstStyle/>
           <a:p>
-            <a:endParaRPr lang="en-US"/>
+            <a:endParaRPr lang="en-US" dirty="0"/>
           </a:p>
         </p:txBody>
       </p:sp>
@@ -502,7 +502,7 @@
               <a:rPr lang="en-US" smtClean="0"/>
               <a:t>‹#›</a:t>
             </a:fld>
-            <a:endParaRPr lang="en-US"/>
+            <a:endParaRPr lang="en-US" dirty="0"/>
           </a:p>
         </p:txBody>
       </p:sp>
@@ -638,9 +638,9 @@
           <a:p>
             <a:fld id="{A5D0B455-88A9-8143-8BEA-7DBBC3C41270}" type="datetimeFigureOut">
               <a:rPr lang="en-US" smtClean="0"/>
-              <a:t>12/7/14</a:t>
+              <a:t>12/8/14</a:t>
             </a:fld>
-            <a:endParaRPr lang="en-US"/>
+            <a:endParaRPr lang="en-US" dirty="0"/>
           </a:p>
         </p:txBody>
       </p:sp>
@@ -659,7 +659,7 @@
           <a:bodyPr/>
           <a:lstStyle/>
           <a:p>
-            <a:endParaRPr lang="en-US"/>
+            <a:endParaRPr lang="en-US" dirty="0"/>
           </a:p>
         </p:txBody>
       </p:sp>
@@ -682,7 +682,7 @@
               <a:rPr lang="en-US" smtClean="0"/>
               <a:t>‹#›</a:t>
             </a:fld>
-            <a:endParaRPr lang="en-US"/>
+            <a:endParaRPr lang="en-US" dirty="0"/>
           </a:p>
         </p:txBody>
       </p:sp>
@@ -808,9 +808,9 @@
           <a:p>
             <a:fld id="{A5D0B455-88A9-8143-8BEA-7DBBC3C41270}" type="datetimeFigureOut">
               <a:rPr lang="en-US" smtClean="0"/>
-              <a:t>12/7/14</a:t>
+              <a:t>12/8/14</a:t>
             </a:fld>
-            <a:endParaRPr lang="en-US"/>
+            <a:endParaRPr lang="en-US" dirty="0"/>
           </a:p>
         </p:txBody>
       </p:sp>
@@ -829,7 +829,7 @@
           <a:bodyPr/>
           <a:lstStyle/>
           <a:p>
-            <a:endParaRPr lang="en-US"/>
+            <a:endParaRPr lang="en-US" dirty="0"/>
           </a:p>
         </p:txBody>
       </p:sp>
@@ -852,7 +852,7 @@
               <a:rPr lang="en-US" smtClean="0"/>
               <a:t>‹#›</a:t>
             </a:fld>
-            <a:endParaRPr lang="en-US"/>
+            <a:endParaRPr lang="en-US" dirty="0"/>
           </a:p>
         </p:txBody>
       </p:sp>
@@ -1054,9 +1054,9 @@
           <a:p>
             <a:fld id="{A5D0B455-88A9-8143-8BEA-7DBBC3C41270}" type="datetimeFigureOut">
               <a:rPr lang="en-US" smtClean="0"/>
-              <a:t>12/7/14</a:t>
+              <a:t>12/8/14</a:t>
             </a:fld>
-            <a:endParaRPr lang="en-US"/>
+            <a:endParaRPr lang="en-US" dirty="0"/>
           </a:p>
         </p:txBody>
       </p:sp>
@@ -1075,7 +1075,7 @@
           <a:bodyPr/>
           <a:lstStyle/>
           <a:p>
-            <a:endParaRPr lang="en-US"/>
+            <a:endParaRPr lang="en-US" dirty="0"/>
           </a:p>
         </p:txBody>
       </p:sp>
@@ -1098,7 +1098,7 @@
               <a:rPr lang="en-US" smtClean="0"/>
               <a:t>‹#›</a:t>
             </a:fld>
-            <a:endParaRPr lang="en-US"/>
+            <a:endParaRPr lang="en-US" dirty="0"/>
           </a:p>
         </p:txBody>
       </p:sp>
@@ -1342,9 +1342,9 @@
           <a:p>
             <a:fld id="{A5D0B455-88A9-8143-8BEA-7DBBC3C41270}" type="datetimeFigureOut">
               <a:rPr lang="en-US" smtClean="0"/>
-              <a:t>12/7/14</a:t>
+              <a:t>12/8/14</a:t>
             </a:fld>
-            <a:endParaRPr lang="en-US"/>
+            <a:endParaRPr lang="en-US" dirty="0"/>
           </a:p>
         </p:txBody>
       </p:sp>
@@ -1363,7 +1363,7 @@
           <a:bodyPr/>
           <a:lstStyle/>
           <a:p>
-            <a:endParaRPr lang="en-US"/>
+            <a:endParaRPr lang="en-US" dirty="0"/>
           </a:p>
         </p:txBody>
       </p:sp>
@@ -1386,7 +1386,7 @@
               <a:rPr lang="en-US" smtClean="0"/>
               <a:t>‹#›</a:t>
             </a:fld>
-            <a:endParaRPr lang="en-US"/>
+            <a:endParaRPr lang="en-US" dirty="0"/>
           </a:p>
         </p:txBody>
       </p:sp>
@@ -1769,9 +1769,9 @@
           <a:p>
             <a:fld id="{A5D0B455-88A9-8143-8BEA-7DBBC3C41270}" type="datetimeFigureOut">
               <a:rPr lang="en-US" smtClean="0"/>
-              <a:t>12/7/14</a:t>
+              <a:t>12/8/14</a:t>
             </a:fld>
-            <a:endParaRPr lang="en-US"/>
+            <a:endParaRPr lang="en-US" dirty="0"/>
           </a:p>
         </p:txBody>
       </p:sp>
@@ -1790,7 +1790,7 @@
           <a:bodyPr/>
           <a:lstStyle/>
           <a:p>
-            <a:endParaRPr lang="en-US"/>
+            <a:endParaRPr lang="en-US" dirty="0"/>
           </a:p>
         </p:txBody>
       </p:sp>
@@ -1813,7 +1813,7 @@
               <a:rPr lang="en-US" smtClean="0"/>
               <a:t>‹#›</a:t>
             </a:fld>
-            <a:endParaRPr lang="en-US"/>
+            <a:endParaRPr lang="en-US" dirty="0"/>
           </a:p>
         </p:txBody>
       </p:sp>
@@ -1887,9 +1887,9 @@
           <a:p>
             <a:fld id="{A5D0B455-88A9-8143-8BEA-7DBBC3C41270}" type="datetimeFigureOut">
               <a:rPr lang="en-US" smtClean="0"/>
-              <a:t>12/7/14</a:t>
+              <a:t>12/8/14</a:t>
             </a:fld>
-            <a:endParaRPr lang="en-US"/>
+            <a:endParaRPr lang="en-US" dirty="0"/>
           </a:p>
         </p:txBody>
       </p:sp>
@@ -1908,7 +1908,7 @@
           <a:bodyPr/>
           <a:lstStyle/>
           <a:p>
-            <a:endParaRPr lang="en-US"/>
+            <a:endParaRPr lang="en-US" dirty="0"/>
           </a:p>
         </p:txBody>
       </p:sp>
@@ -1931,7 +1931,7 @@
               <a:rPr lang="en-US" smtClean="0"/>
               <a:t>‹#›</a:t>
             </a:fld>
-            <a:endParaRPr lang="en-US"/>
+            <a:endParaRPr lang="en-US" dirty="0"/>
           </a:p>
         </p:txBody>
       </p:sp>
@@ -1982,9 +1982,9 @@
           <a:p>
             <a:fld id="{A5D0B455-88A9-8143-8BEA-7DBBC3C41270}" type="datetimeFigureOut">
               <a:rPr lang="en-US" smtClean="0"/>
-              <a:t>12/7/14</a:t>
+              <a:t>12/8/14</a:t>
             </a:fld>
-            <a:endParaRPr lang="en-US"/>
+            <a:endParaRPr lang="en-US" dirty="0"/>
           </a:p>
         </p:txBody>
       </p:sp>
@@ -2003,7 +2003,7 @@
           <a:bodyPr/>
           <a:lstStyle/>
           <a:p>
-            <a:endParaRPr lang="en-US"/>
+            <a:endParaRPr lang="en-US" dirty="0"/>
           </a:p>
         </p:txBody>
       </p:sp>
@@ -2026,7 +2026,7 @@
               <a:rPr lang="en-US" smtClean="0"/>
               <a:t>‹#›</a:t>
             </a:fld>
-            <a:endParaRPr lang="en-US"/>
+            <a:endParaRPr lang="en-US" dirty="0"/>
           </a:p>
         </p:txBody>
       </p:sp>
@@ -2259,9 +2259,9 @@
           <a:p>
             <a:fld id="{A5D0B455-88A9-8143-8BEA-7DBBC3C41270}" type="datetimeFigureOut">
               <a:rPr lang="en-US" smtClean="0"/>
-              <a:t>12/7/14</a:t>
+              <a:t>12/8/14</a:t>
             </a:fld>
-            <a:endParaRPr lang="en-US"/>
+            <a:endParaRPr lang="en-US" dirty="0"/>
           </a:p>
         </p:txBody>
       </p:sp>
@@ -2280,7 +2280,7 @@
           <a:bodyPr/>
           <a:lstStyle/>
           <a:p>
-            <a:endParaRPr lang="en-US"/>
+            <a:endParaRPr lang="en-US" dirty="0"/>
           </a:p>
         </p:txBody>
       </p:sp>
@@ -2303,7 +2303,7 @@
               <a:rPr lang="en-US" smtClean="0"/>
               <a:t>‹#›</a:t>
             </a:fld>
-            <a:endParaRPr lang="en-US"/>
+            <a:endParaRPr lang="en-US" dirty="0"/>
           </a:p>
         </p:txBody>
       </p:sp>
@@ -2426,7 +2426,7 @@
             </a:lvl9pPr>
           </a:lstStyle>
           <a:p>
-            <a:endParaRPr lang="en-US"/>
+            <a:endParaRPr lang="en-US" dirty="0"/>
           </a:p>
         </p:txBody>
       </p:sp>
@@ -2512,9 +2512,9 @@
           <a:p>
             <a:fld id="{A5D0B455-88A9-8143-8BEA-7DBBC3C41270}" type="datetimeFigureOut">
               <a:rPr lang="en-US" smtClean="0"/>
-              <a:t>12/7/14</a:t>
+              <a:t>12/8/14</a:t>
             </a:fld>
-            <a:endParaRPr lang="en-US"/>
+            <a:endParaRPr lang="en-US" dirty="0"/>
           </a:p>
         </p:txBody>
       </p:sp>
@@ -2533,7 +2533,7 @@
           <a:bodyPr/>
           <a:lstStyle/>
           <a:p>
-            <a:endParaRPr lang="en-US"/>
+            <a:endParaRPr lang="en-US" dirty="0"/>
           </a:p>
         </p:txBody>
       </p:sp>
@@ -2556,7 +2556,7 @@
               <a:rPr lang="en-US" smtClean="0"/>
               <a:t>‹#›</a:t>
             </a:fld>
-            <a:endParaRPr lang="en-US"/>
+            <a:endParaRPr lang="en-US" dirty="0"/>
           </a:p>
         </p:txBody>
       </p:sp>
@@ -2725,9 +2725,9 @@
           <a:p>
             <a:fld id="{A5D0B455-88A9-8143-8BEA-7DBBC3C41270}" type="datetimeFigureOut">
               <a:rPr lang="en-US" smtClean="0"/>
-              <a:t>12/7/14</a:t>
+              <a:t>12/8/14</a:t>
             </a:fld>
-            <a:endParaRPr lang="en-US"/>
+            <a:endParaRPr lang="en-US" dirty="0"/>
           </a:p>
         </p:txBody>
       </p:sp>
@@ -2764,7 +2764,7 @@
             </a:lvl1pPr>
           </a:lstStyle>
           <a:p>
-            <a:endParaRPr lang="en-US"/>
+            <a:endParaRPr lang="en-US" dirty="0"/>
           </a:p>
         </p:txBody>
       </p:sp>
@@ -2805,7 +2805,7 @@
               <a:rPr lang="en-US" smtClean="0"/>
               <a:t>‹#›</a:t>
             </a:fld>
-            <a:endParaRPr lang="en-US"/>
+            <a:endParaRPr lang="en-US" dirty="0"/>
           </a:p>
         </p:txBody>
       </p:sp>
@@ -4226,11 +4226,11 @@
           <a:p>
             <a:pPr algn="ctr"/>
             <a:r>
-              <a:rPr lang="en-US" sz="9600" b="1" dirty="0" err="1" smtClean="0"/>
+              <a:rPr lang="en-US" sz="9600" b="1" dirty="0" smtClean="0"/>
               <a:t>O</a:t>
             </a:r>
             <a:r>
-              <a:rPr lang="en-US" sz="9600" b="1" dirty="0" err="1" smtClean="0">
+              <a:rPr lang="en-US" sz="9600" b="1" dirty="0" smtClean="0">
                 <a:solidFill>
                   <a:srgbClr val="0000FF"/>
                 </a:solidFill>
@@ -4238,22 +4238,17 @@
               <a:t>pen</a:t>
             </a:r>
             <a:r>
-              <a:rPr lang="en-US" sz="9600" b="1" dirty="0" err="1" smtClean="0"/>
+              <a:rPr lang="en-US" sz="9600" b="1" dirty="0" smtClean="0"/>
               <a:t>N</a:t>
             </a:r>
             <a:r>
-              <a:rPr lang="en-US" sz="9600" b="1" dirty="0" err="1" smtClean="0">
+              <a:rPr lang="en-US" sz="9600" b="1" dirty="0" smtClean="0">
                 <a:solidFill>
                   <a:srgbClr val="0000FF"/>
                 </a:solidFill>
               </a:rPr>
               <a:t>ote</a:t>
             </a:r>
-            <a:endParaRPr lang="en-US" sz="9600" b="1" dirty="0" smtClean="0">
-              <a:solidFill>
-                <a:srgbClr val="0000FF"/>
-              </a:solidFill>
-            </a:endParaRPr>
           </a:p>
           <a:p>
             <a:pPr algn="ctr"/>
@@ -4266,25 +4261,15 @@
             <a:pPr algn="ctr"/>
             <a:r>
               <a:rPr lang="en-US" sz="2000" dirty="0" smtClean="0"/>
-              <a:t>Kim </a:t>
-            </a:r>
-            <a:r>
-              <a:rPr lang="en-US" sz="2000" dirty="0" err="1" smtClean="0"/>
-              <a:t>Booe</a:t>
-            </a:r>
-            <a:endParaRPr lang="en-US" sz="2000" dirty="0" smtClean="0"/>
+              <a:t>Kim Booe</a:t>
+            </a:r>
           </a:p>
           <a:p>
             <a:pPr algn="ctr"/>
             <a:r>
               <a:rPr lang="en-US" sz="2000" dirty="0" smtClean="0"/>
-              <a:t>Shaun Van </a:t>
-            </a:r>
-            <a:r>
-              <a:rPr lang="en-US" sz="2000" dirty="0" err="1" smtClean="0"/>
-              <a:t>Weelden</a:t>
-            </a:r>
-            <a:endParaRPr lang="en-US" sz="2000" dirty="0" smtClean="0"/>
+              <a:t>Shaun Van Weelden</a:t>
+            </a:r>
           </a:p>
           <a:p>
             <a:pPr algn="ctr"/>
@@ -4297,13 +4282,8 @@
             <a:pPr algn="ctr"/>
             <a:r>
               <a:rPr lang="en-US" sz="2000" dirty="0" smtClean="0"/>
-              <a:t>Alec </a:t>
-            </a:r>
-            <a:r>
-              <a:rPr lang="en-US" sz="2000" dirty="0" err="1" smtClean="0"/>
-              <a:t>Poczatek</a:t>
-            </a:r>
-            <a:endParaRPr lang="en-US" sz="2000" dirty="0" smtClean="0"/>
+              <a:t>Alec Poczatek</a:t>
+            </a:r>
           </a:p>
           <a:p>
             <a:pPr algn="ctr"/>
@@ -4323,8 +4303,8 @@
         </p:nvSpPr>
         <p:spPr>
           <a:xfrm>
-            <a:off x="713854" y="4211697"/>
-            <a:ext cx="13970193" cy="2031325"/>
+            <a:off x="1058688" y="4078010"/>
+            <a:ext cx="13970193" cy="3077766"/>
           </a:xfrm>
           <a:prstGeom prst="rect">
             <a:avLst/>
@@ -4338,9 +4318,18 @@
           <a:lstStyle/>
           <a:p>
             <a:r>
-              <a:rPr lang="en-US" sz="2400" dirty="0" smtClean="0"/>
-              <a:t>Note taking has never been so much fun and collaborative before.  OpenNote’s Real-time synchronization technology allows students to not only save their own notes, but to add classmates and instructors notes as well.  When students take notes together the whole class benefits.</a:t>
-            </a:r>
+              <a:rPr lang="en-US" sz="2800" dirty="0" smtClean="0"/>
+              <a:t>Note taking has never been so much fun and collaborative before.  OpenNote’s Real-time synchronization technology allows students to not only save their own notes, but to add classmates and instructors notes as well.  When students take notes together the whole class benefits</a:t>
+            </a:r>
+            <a:r>
+              <a:rPr lang="en-US" sz="2800" dirty="0" smtClean="0"/>
+              <a:t>.  Below is an image of the login screen. From this screen, you can login, or as a new user, you can register a new account with OpenNote</a:t>
+            </a:r>
+            <a:r>
+              <a:rPr lang="en-US" sz="2800" dirty="0" smtClean="0"/>
+              <a:t>; this modal is also displayed below.</a:t>
+            </a:r>
+            <a:endParaRPr lang="en-US" sz="2800" dirty="0" smtClean="0"/>
           </a:p>
           <a:p>
             <a:endParaRPr lang="en-US" sz="5400" dirty="0"/>
@@ -4355,8 +4344,8 @@
         </p:nvSpPr>
         <p:spPr>
           <a:xfrm>
-            <a:off x="19202396" y="4029553"/>
-            <a:ext cx="13428658" cy="3077766"/>
+            <a:off x="1058688" y="12484231"/>
+            <a:ext cx="14315027" cy="5847755"/>
           </a:xfrm>
           <a:prstGeom prst="rect">
             <a:avLst/>
@@ -4376,9 +4365,14 @@
           </a:p>
           <a:p>
             <a:r>
-              <a:rPr lang="en-US" sz="2400" dirty="0" smtClean="0"/>
-              <a:t>The user interface for the student and class creator are one in the same.  The only difference is that the class creator has more power within the app.  They can manage their classes by removing users or changing the class specs/information.</a:t>
-            </a:r>
+              <a:rPr lang="en-US" sz="2800" dirty="0" smtClean="0"/>
+              <a:t>The user interface for the student and class creator are one in the same.  The only difference is that the class creator has more power within the app.  They can manage their classes by removing users or changing the class specs/information</a:t>
+            </a:r>
+            <a:r>
+              <a:rPr lang="en-US" sz="2800" dirty="0" smtClean="0"/>
+              <a:t>.  Below is the main screen a user would see when using OpenNote.  This is the ‘Document Screen.’  From this screen, you can join classes, create classes, create notes, view other students notes, contact OpenNote management, view your profile and change the settings on how you would like to take notes.  These are all features available as a student.  From the class creator side of things, you can also open your ‘Manage Classes’ modal, in order to add or remove students, as well, you can change the information pertaining to the class.</a:t>
+            </a:r>
+            <a:endParaRPr lang="en-US" sz="2800" dirty="0" smtClean="0"/>
           </a:p>
           <a:p>
             <a:endParaRPr lang="en-US" dirty="0"/>
@@ -4393,10 +4387,10 @@
         </p:nvGrpSpPr>
         <p:grpSpPr>
           <a:xfrm>
-            <a:off x="713854" y="11785330"/>
-            <a:ext cx="12345274" cy="8397456"/>
+            <a:off x="1058688" y="6934122"/>
+            <a:ext cx="8386254" cy="5712224"/>
             <a:chOff x="1542164" y="26752284"/>
-            <a:chExt cx="12345274" cy="8397456"/>
+            <a:chExt cx="12345274" cy="8369409"/>
           </a:xfrm>
         </p:grpSpPr>
         <p:pic>
@@ -4437,8 +4431,8 @@
           </p:nvSpPr>
           <p:spPr>
             <a:xfrm>
-              <a:off x="11517828" y="34564964"/>
-              <a:ext cx="2298426" cy="584776"/>
+              <a:off x="11824019" y="34564964"/>
+              <a:ext cx="2063419" cy="556729"/>
             </a:xfrm>
             <a:prstGeom prst="rect">
               <a:avLst/>
@@ -4452,10 +4446,10 @@
             <a:lstStyle/>
             <a:p>
               <a:r>
-                <a:rPr lang="en-US" sz="3200" dirty="0" smtClean="0"/>
+                <a:rPr lang="en-US" sz="2000" dirty="0" smtClean="0"/>
                 <a:t>Login Screen</a:t>
               </a:r>
-              <a:endParaRPr lang="en-US" sz="3200" dirty="0"/>
+              <a:endParaRPr lang="en-US" sz="2000" dirty="0"/>
             </a:p>
           </p:txBody>
         </p:sp>
@@ -4468,10 +4462,10 @@
         </p:nvGrpSpPr>
         <p:grpSpPr>
           <a:xfrm>
-            <a:off x="19338336" y="11218290"/>
-            <a:ext cx="12505576" cy="7827819"/>
+            <a:off x="3604074" y="17064202"/>
+            <a:ext cx="9238599" cy="6380050"/>
             <a:chOff x="20125478" y="27188234"/>
-            <a:chExt cx="12505576" cy="7827819"/>
+            <a:chExt cx="12505576" cy="7643153"/>
           </a:xfrm>
         </p:grpSpPr>
         <p:pic>
@@ -4512,8 +4506,8 @@
           </p:nvSpPr>
           <p:spPr>
             <a:xfrm>
-              <a:off x="29481434" y="34431277"/>
-              <a:ext cx="3149620" cy="584776"/>
+              <a:off x="30593292" y="34431277"/>
+              <a:ext cx="2037762" cy="400110"/>
             </a:xfrm>
             <a:prstGeom prst="rect">
               <a:avLst/>
@@ -4527,10 +4521,10 @@
             <a:lstStyle/>
             <a:p>
               <a:r>
-                <a:rPr lang="en-US" sz="3200" dirty="0" smtClean="0"/>
+                <a:rPr lang="en-US" sz="2000" dirty="0" smtClean="0"/>
                 <a:t>Document Screen</a:t>
               </a:r>
-              <a:endParaRPr lang="en-US" sz="3200" dirty="0"/>
+              <a:endParaRPr lang="en-US" sz="2000" dirty="0"/>
             </a:p>
           </p:txBody>
         </p:sp>
@@ -4543,8 +4537,8 @@
         </p:nvSpPr>
         <p:spPr>
           <a:xfrm>
-            <a:off x="713852" y="9231423"/>
-            <a:ext cx="13970194" cy="1384995"/>
+            <a:off x="17645106" y="20212597"/>
+            <a:ext cx="13970194" cy="3231654"/>
           </a:xfrm>
           <a:prstGeom prst="rect">
             <a:avLst/>
@@ -4564,10 +4558,14 @@
           </a:p>
           <a:p>
             <a:r>
-              <a:rPr lang="en-US" sz="2400" dirty="0" smtClean="0"/>
-              <a:t>Above is an image of the login screen.  We decided to use a chalk-type font to be cohesive with our note taking theme.  It is a very simple user interface, however uses modern transitions from one screen to another.</a:t>
-            </a:r>
-            <a:endParaRPr lang="en-US" sz="2400" dirty="0"/>
+              <a:rPr lang="en-US" sz="2800" dirty="0" smtClean="0"/>
+              <a:t>Above is an image of the login screen.  We decided to use a chalk-type font to be cohesive with our note taking theme.  It is a very simple user interface, however uses modern transitions from one screen to another</a:t>
+            </a:r>
+            <a:r>
+              <a:rPr lang="en-US" sz="2800" dirty="0" smtClean="0"/>
+              <a:t>.  We also decided to use modals to display every pop up window.  It is a very modern approach, and rather than switching to a different screen, the window simply has a modal pop up to display the information.  Below is a block diagram of how information is processed within firebase, and the users local machine.</a:t>
+            </a:r>
+            <a:endParaRPr lang="en-US" sz="2800" dirty="0"/>
           </a:p>
         </p:txBody>
       </p:sp>
@@ -4579,8 +4577,8 @@
         </p:nvSpPr>
         <p:spPr>
           <a:xfrm>
-            <a:off x="31073624" y="43306424"/>
-            <a:ext cx="1844776" cy="584776"/>
+            <a:off x="24489284" y="43306424"/>
+            <a:ext cx="8429116" cy="584776"/>
           </a:xfrm>
           <a:prstGeom prst="rect">
             <a:avLst/>
@@ -4588,22 +4586,197 @@
           <a:noFill/>
         </p:spPr>
         <p:txBody>
-          <a:bodyPr wrap="none" rtlCol="0">
+          <a:bodyPr wrap="square" rtlCol="0">
             <a:spAutoFit/>
           </a:bodyPr>
           <a:lstStyle/>
           <a:p>
             <a:r>
               <a:rPr lang="en-US" sz="3200" dirty="0" smtClean="0"/>
-              <a:t>Team R17</a:t>
+              <a:t>Team </a:t>
+            </a:r>
+            <a:r>
+              <a:rPr lang="en-US" sz="3200" dirty="0" smtClean="0"/>
+              <a:t>R17 – Raising the Bar</a:t>
             </a:r>
             <a:endParaRPr lang="en-US" sz="3200" dirty="0"/>
+          </a:p>
+        </p:txBody>
+      </p:sp>
+      <p:sp>
+        <p:nvSpPr>
+          <p:cNvPr id="58" name="TextBox 57"/>
+          <p:cNvSpPr txBox="1"/>
+          <p:nvPr/>
+        </p:nvSpPr>
+        <p:spPr>
+          <a:xfrm>
+            <a:off x="17631934" y="4078010"/>
+            <a:ext cx="13983366" cy="3662541"/>
+          </a:xfrm>
+          <a:prstGeom prst="rect">
+            <a:avLst/>
+          </a:prstGeom>
+          <a:noFill/>
+        </p:spPr>
+        <p:txBody>
+          <a:bodyPr wrap="square" rtlCol="0">
+            <a:spAutoFit/>
+          </a:bodyPr>
+          <a:lstStyle/>
+          <a:p>
+            <a:r>
+              <a:rPr lang="en-US" sz="3600" b="1" dirty="0" smtClean="0"/>
+              <a:t>Use-Cases</a:t>
+            </a:r>
+          </a:p>
+          <a:p>
+            <a:r>
+              <a:rPr lang="en-US" sz="2800" dirty="0" smtClean="0"/>
+              <a:t>The app is geared towards the student.  The student has the ability to take notes, and share them collaboratively with other classmates.  Once a note is created, the student can compare their notes with other classmates in order to fill in a spot they missed, or to insert a better note.  The student can also split their notes into different portions, edit their note portions, delete their note portions, or combine their note portions.  As a class creator, you have the ability to remove inappropriate users from your class, or to change the information pertaining to the </a:t>
+            </a:r>
+            <a:r>
+              <a:rPr lang="en-US" sz="2800" dirty="0" smtClean="0"/>
+              <a:t>class.  The use cases diagram is displayed below. </a:t>
+            </a:r>
+            <a:endParaRPr lang="en-US" sz="2800" dirty="0"/>
+          </a:p>
+        </p:txBody>
+      </p:sp>
+      <p:sp>
+        <p:nvSpPr>
+          <p:cNvPr id="59" name="TextBox 58"/>
+          <p:cNvSpPr txBox="1"/>
+          <p:nvPr/>
+        </p:nvSpPr>
+        <p:spPr>
+          <a:xfrm>
+            <a:off x="17631934" y="15688281"/>
+            <a:ext cx="13970192" cy="4524316"/>
+          </a:xfrm>
+          <a:prstGeom prst="rect">
+            <a:avLst/>
+          </a:prstGeom>
+          <a:noFill/>
+        </p:spPr>
+        <p:txBody>
+          <a:bodyPr wrap="square" rtlCol="0">
+            <a:spAutoFit/>
+          </a:bodyPr>
+          <a:lstStyle/>
+          <a:p>
+            <a:r>
+              <a:rPr lang="en-US" sz="3600" b="1" dirty="0" smtClean="0"/>
+              <a:t>Actors</a:t>
+            </a:r>
+          </a:p>
+          <a:p>
+            <a:r>
+              <a:rPr lang="en-US" sz="2800" dirty="0" smtClean="0"/>
+              <a:t>OpenNote consists of </a:t>
+            </a:r>
+            <a:r>
+              <a:rPr lang="en-US" sz="2800" dirty="0" smtClean="0"/>
+              <a:t>two </a:t>
+            </a:r>
+            <a:r>
+              <a:rPr lang="en-US" sz="2800" dirty="0" smtClean="0"/>
+              <a:t>different types of </a:t>
+            </a:r>
+            <a:r>
+              <a:rPr lang="en-US" sz="2800" dirty="0" smtClean="0"/>
+              <a:t>actors.  The above image depicts three actors, however, in the updated version of OpenNote, the app admin role is played by the class creator.  The roles are as follows:</a:t>
+            </a:r>
+            <a:endParaRPr lang="en-US" sz="2800" dirty="0" smtClean="0"/>
+          </a:p>
+          <a:p>
+            <a:r>
+              <a:rPr lang="en-US" sz="2800" dirty="0" smtClean="0"/>
+              <a:t>	</a:t>
+            </a:r>
+            <a:r>
+              <a:rPr lang="en-US" sz="2800" b="1" dirty="0" smtClean="0"/>
+              <a:t>Student</a:t>
+            </a:r>
+            <a:r>
+              <a:rPr lang="en-US" sz="2800" dirty="0" smtClean="0"/>
+              <a:t> – Every user that uses the app to take notes is considered a student.  They are the users that use the app to keep their </a:t>
+            </a:r>
+            <a:r>
+              <a:rPr lang="en-US" sz="2800" dirty="0" smtClean="0"/>
+              <a:t>notes </a:t>
+            </a:r>
+            <a:r>
+              <a:rPr lang="en-US" sz="2800" dirty="0" smtClean="0"/>
+              <a:t>organized and work together collaboratively with other students to create the best possible notes.</a:t>
+            </a:r>
+          </a:p>
+          <a:p>
+            <a:r>
+              <a:rPr lang="en-US" sz="2800" dirty="0" smtClean="0"/>
+              <a:t>	</a:t>
+            </a:r>
+            <a:r>
+              <a:rPr lang="en-US" sz="2800" b="1" dirty="0" smtClean="0"/>
+              <a:t>Class Creator </a:t>
+            </a:r>
+            <a:r>
+              <a:rPr lang="en-US" sz="2800" dirty="0" smtClean="0"/>
+              <a:t>– The user that has originally created the class.  This user is able to remove users from their class, as well as delete the class they created if they like.</a:t>
+            </a:r>
+          </a:p>
+          <a:p>
+            <a:endParaRPr lang="en-US" sz="2800" dirty="0"/>
+          </a:p>
+        </p:txBody>
+      </p:sp>
+      <p:sp>
+        <p:nvSpPr>
+          <p:cNvPr id="60" name="TextBox 59"/>
+          <p:cNvSpPr txBox="1"/>
+          <p:nvPr/>
+        </p:nvSpPr>
+        <p:spPr>
+          <a:xfrm>
+            <a:off x="17509642" y="37072420"/>
+            <a:ext cx="6837429" cy="4955203"/>
+          </a:xfrm>
+          <a:prstGeom prst="rect">
+            <a:avLst/>
+          </a:prstGeom>
+          <a:noFill/>
+        </p:spPr>
+        <p:txBody>
+          <a:bodyPr wrap="square" rtlCol="0">
+            <a:spAutoFit/>
+          </a:bodyPr>
+          <a:lstStyle/>
+          <a:p>
+            <a:r>
+              <a:rPr lang="en-US" sz="3600" b="1" dirty="0" smtClean="0"/>
+              <a:t>Team Info</a:t>
+            </a:r>
+          </a:p>
+          <a:p>
+            <a:r>
+              <a:rPr lang="en-US" sz="2800" dirty="0" smtClean="0"/>
+              <a:t>Coming into this project, none of our group members knew too much about </a:t>
+            </a:r>
+            <a:r>
+              <a:rPr lang="en-US" sz="2800" dirty="0" smtClean="0"/>
+              <a:t>each other.  </a:t>
+            </a:r>
+            <a:r>
+              <a:rPr lang="en-US" sz="2800" dirty="0" smtClean="0"/>
+              <a:t>But having spent a whole semester together we have learned a lot, and grown to become very good friends.  We learned a great deal about the process involved in making an app, as well as how important communication is.  It isn’t always opportune to meet for everyone so it is extremely important to split up work and collaborate often.</a:t>
+            </a:r>
+            <a:endParaRPr lang="en-US" sz="2800" dirty="0"/>
           </a:p>
         </p:txBody>
       </p:sp>
       <p:pic>
         <p:nvPicPr>
-          <p:cNvPr id="57" name="Picture 56" descr="Screen Shot 2014-12-07 at 4.53.10 PM.png"/>
+          <p:cNvPr id="9" name="Picture 8" descr="Screen Shot 2014-12-07 at 11.56.51 PM.png"/>
           <p:cNvPicPr>
             <a:picLocks noChangeAspect="1"/>
           </p:cNvPicPr>
@@ -4623,24 +4796,774 @@
         </p:blipFill>
         <p:spPr>
           <a:xfrm>
-            <a:off x="713854" y="21214682"/>
-            <a:ext cx="6238040" cy="7380472"/>
+            <a:off x="24489284" y="37527924"/>
+            <a:ext cx="7962900" cy="5778500"/>
           </a:xfrm>
           <a:prstGeom prst="rect">
             <a:avLst/>
           </a:prstGeom>
         </p:spPr>
       </p:pic>
-      <p:sp>
-        <p:nvSpPr>
-          <p:cNvPr id="58" name="TextBox 57"/>
+      <p:grpSp>
+        <p:nvGrpSpPr>
+          <p:cNvPr id="22" name="Group 21"/>
+          <p:cNvGrpSpPr/>
+          <p:nvPr/>
+        </p:nvGrpSpPr>
+        <p:grpSpPr>
+          <a:xfrm>
+            <a:off x="21410548" y="8116648"/>
+            <a:ext cx="6157471" cy="7529805"/>
+            <a:chOff x="713854" y="21214681"/>
+            <a:chExt cx="7503114" cy="9347386"/>
+          </a:xfrm>
+        </p:grpSpPr>
+        <p:pic>
+          <p:nvPicPr>
+            <p:cNvPr id="57" name="Picture 56" descr="Screen Shot 2014-12-07 at 4.53.10 PM.png"/>
+            <p:cNvPicPr>
+              <a:picLocks noChangeAspect="1"/>
+            </p:cNvPicPr>
+            <p:nvPr/>
+          </p:nvPicPr>
+          <p:blipFill>
+            <a:blip r:embed="rId5">
+              <a:extLst>
+                <a:ext uri="{28A0092B-C50C-407E-A947-70E740481C1C}">
+                  <a14:useLocalDpi xmlns:a14="http://schemas.microsoft.com/office/drawing/2010/main" val="0"/>
+                </a:ext>
+              </a:extLst>
+            </a:blip>
+            <a:stretch>
+              <a:fillRect/>
+            </a:stretch>
+          </p:blipFill>
+          <p:spPr>
+            <a:xfrm>
+              <a:off x="713854" y="21214681"/>
+              <a:ext cx="7503114" cy="8877231"/>
+            </a:xfrm>
+            <a:prstGeom prst="rect">
+              <a:avLst/>
+            </a:prstGeom>
+          </p:spPr>
+        </p:pic>
+        <p:sp>
+          <p:nvSpPr>
+            <p:cNvPr id="21" name="TextBox 20"/>
+            <p:cNvSpPr txBox="1"/>
+            <p:nvPr/>
+          </p:nvSpPr>
+          <p:spPr>
+            <a:xfrm>
+              <a:off x="6012143" y="30161957"/>
+              <a:ext cx="2204825" cy="400110"/>
+            </a:xfrm>
+            <a:prstGeom prst="rect">
+              <a:avLst/>
+            </a:prstGeom>
+            <a:noFill/>
+          </p:spPr>
+          <p:txBody>
+            <a:bodyPr wrap="none" rtlCol="0">
+              <a:spAutoFit/>
+            </a:bodyPr>
+            <a:lstStyle/>
+            <a:p>
+              <a:r>
+                <a:rPr lang="en-US" sz="2000" dirty="0" smtClean="0"/>
+                <a:t>Different Use-cases</a:t>
+              </a:r>
+              <a:endParaRPr lang="en-US" sz="2000" dirty="0"/>
+            </a:p>
+          </p:txBody>
+        </p:sp>
+      </p:grpSp>
+      <p:grpSp>
+        <p:nvGrpSpPr>
+          <p:cNvPr id="24" name="Group 23"/>
+          <p:cNvGrpSpPr/>
+          <p:nvPr/>
+        </p:nvGrpSpPr>
+        <p:grpSpPr>
+          <a:xfrm>
+            <a:off x="1058688" y="36923298"/>
+            <a:ext cx="6109797" cy="6670476"/>
+            <a:chOff x="12255925" y="21195757"/>
+            <a:chExt cx="7632700" cy="9366310"/>
+          </a:xfrm>
+        </p:grpSpPr>
+        <p:pic>
+          <p:nvPicPr>
+            <p:cNvPr id="2" name="Picture 1" descr="Screen Shot 2014-12-08 at 7.43.45 PM.png"/>
+            <p:cNvPicPr>
+              <a:picLocks noChangeAspect="1"/>
+            </p:cNvPicPr>
+            <p:nvPr/>
+          </p:nvPicPr>
+          <p:blipFill>
+            <a:blip r:embed="rId6">
+              <a:extLst>
+                <a:ext uri="{28A0092B-C50C-407E-A947-70E740481C1C}">
+                  <a14:useLocalDpi xmlns:a14="http://schemas.microsoft.com/office/drawing/2010/main" val="0"/>
+                </a:ext>
+              </a:extLst>
+            </a:blip>
+            <a:stretch>
+              <a:fillRect/>
+            </a:stretch>
+          </p:blipFill>
+          <p:spPr>
+            <a:xfrm>
+              <a:off x="12255925" y="21195757"/>
+              <a:ext cx="7632700" cy="8966200"/>
+            </a:xfrm>
+            <a:prstGeom prst="rect">
+              <a:avLst/>
+            </a:prstGeom>
+          </p:spPr>
+        </p:pic>
+        <p:sp>
+          <p:nvSpPr>
+            <p:cNvPr id="23" name="TextBox 22"/>
+            <p:cNvSpPr txBox="1"/>
+            <p:nvPr/>
+          </p:nvSpPr>
+          <p:spPr>
+            <a:xfrm>
+              <a:off x="16791750" y="30161958"/>
+              <a:ext cx="2552602" cy="400109"/>
+            </a:xfrm>
+            <a:prstGeom prst="rect">
+              <a:avLst/>
+            </a:prstGeom>
+            <a:noFill/>
+          </p:spPr>
+          <p:txBody>
+            <a:bodyPr wrap="none" rtlCol="0">
+              <a:spAutoFit/>
+            </a:bodyPr>
+            <a:lstStyle/>
+            <a:p>
+              <a:r>
+                <a:rPr lang="en-US" sz="2000" dirty="0" smtClean="0"/>
+                <a:t>Personal Profile Modal</a:t>
+              </a:r>
+              <a:endParaRPr lang="en-US" sz="2000" dirty="0"/>
+            </a:p>
+          </p:txBody>
+        </p:sp>
+      </p:grpSp>
+      <p:grpSp>
+        <p:nvGrpSpPr>
+          <p:cNvPr id="50" name="Group 49"/>
+          <p:cNvGrpSpPr/>
+          <p:nvPr/>
+        </p:nvGrpSpPr>
+        <p:grpSpPr>
+          <a:xfrm>
+            <a:off x="8196058" y="37056985"/>
+            <a:ext cx="7962900" cy="3607775"/>
+            <a:chOff x="19683301" y="20646345"/>
+            <a:chExt cx="7620000" cy="3958246"/>
+          </a:xfrm>
+        </p:grpSpPr>
+        <p:pic>
+          <p:nvPicPr>
+            <p:cNvPr id="25" name="Picture 24" descr="Screen Shot 2014-12-08 at 7.51.30 PM.png"/>
+            <p:cNvPicPr>
+              <a:picLocks noChangeAspect="1"/>
+            </p:cNvPicPr>
+            <p:nvPr/>
+          </p:nvPicPr>
+          <p:blipFill>
+            <a:blip r:embed="rId7">
+              <a:extLst>
+                <a:ext uri="{28A0092B-C50C-407E-A947-70E740481C1C}">
+                  <a14:useLocalDpi xmlns:a14="http://schemas.microsoft.com/office/drawing/2010/main" val="0"/>
+                </a:ext>
+              </a:extLst>
+            </a:blip>
+            <a:stretch>
+              <a:fillRect/>
+            </a:stretch>
+          </p:blipFill>
+          <p:spPr>
+            <a:xfrm>
+              <a:off x="19683301" y="20646345"/>
+              <a:ext cx="7620000" cy="3238500"/>
+            </a:xfrm>
+            <a:prstGeom prst="rect">
+              <a:avLst/>
+            </a:prstGeom>
+          </p:spPr>
+        </p:pic>
+        <p:sp>
+          <p:nvSpPr>
+            <p:cNvPr id="26" name="TextBox 25"/>
+            <p:cNvSpPr txBox="1"/>
+            <p:nvPr/>
+          </p:nvSpPr>
+          <p:spPr>
+            <a:xfrm>
+              <a:off x="24412065" y="24204481"/>
+              <a:ext cx="2891236" cy="400110"/>
+            </a:xfrm>
+            <a:prstGeom prst="rect">
+              <a:avLst/>
+            </a:prstGeom>
+            <a:noFill/>
+          </p:spPr>
+          <p:txBody>
+            <a:bodyPr wrap="none" rtlCol="0">
+              <a:spAutoFit/>
+            </a:bodyPr>
+            <a:lstStyle/>
+            <a:p>
+              <a:r>
+                <a:rPr lang="en-US" sz="2000" dirty="0" smtClean="0"/>
+                <a:t>Manage Classes Modal - 1</a:t>
+              </a:r>
+              <a:endParaRPr lang="en-US" sz="2000" dirty="0"/>
+            </a:p>
+          </p:txBody>
+        </p:sp>
+      </p:grpSp>
+      <p:grpSp>
+        <p:nvGrpSpPr>
+          <p:cNvPr id="54" name="Group 53"/>
+          <p:cNvGrpSpPr/>
+          <p:nvPr/>
+        </p:nvGrpSpPr>
+        <p:grpSpPr>
+          <a:xfrm>
+            <a:off x="6170620" y="31477259"/>
+            <a:ext cx="5206252" cy="4740517"/>
+            <a:chOff x="19365824" y="24629583"/>
+            <a:chExt cx="7620000" cy="5652502"/>
+          </a:xfrm>
+        </p:grpSpPr>
+        <p:pic>
+          <p:nvPicPr>
+            <p:cNvPr id="51" name="Picture 50" descr="Screen Shot 2014-12-08 at 7.52.19 PM.png"/>
+            <p:cNvPicPr>
+              <a:picLocks noChangeAspect="1"/>
+            </p:cNvPicPr>
+            <p:nvPr/>
+          </p:nvPicPr>
+          <p:blipFill>
+            <a:blip r:embed="rId8">
+              <a:extLst>
+                <a:ext uri="{28A0092B-C50C-407E-A947-70E740481C1C}">
+                  <a14:useLocalDpi xmlns:a14="http://schemas.microsoft.com/office/drawing/2010/main" val="0"/>
+                </a:ext>
+              </a:extLst>
+            </a:blip>
+            <a:stretch>
+              <a:fillRect/>
+            </a:stretch>
+          </p:blipFill>
+          <p:spPr>
+            <a:xfrm>
+              <a:off x="19365824" y="24629583"/>
+              <a:ext cx="7620000" cy="5194300"/>
+            </a:xfrm>
+            <a:prstGeom prst="rect">
+              <a:avLst/>
+            </a:prstGeom>
+          </p:spPr>
+        </p:pic>
+        <p:sp>
+          <p:nvSpPr>
+            <p:cNvPr id="52" name="TextBox 51"/>
+            <p:cNvSpPr txBox="1"/>
+            <p:nvPr/>
+          </p:nvSpPr>
+          <p:spPr>
+            <a:xfrm>
+              <a:off x="22932066" y="29881974"/>
+              <a:ext cx="2891236" cy="400111"/>
+            </a:xfrm>
+            <a:prstGeom prst="rect">
+              <a:avLst/>
+            </a:prstGeom>
+            <a:noFill/>
+          </p:spPr>
+          <p:txBody>
+            <a:bodyPr wrap="none" rtlCol="0">
+              <a:spAutoFit/>
+            </a:bodyPr>
+            <a:lstStyle/>
+            <a:p>
+              <a:r>
+                <a:rPr lang="en-US" sz="2000" dirty="0" smtClean="0"/>
+                <a:t>Manage Classes Modal - 2</a:t>
+              </a:r>
+              <a:endParaRPr lang="en-US" sz="2000" dirty="0"/>
+            </a:p>
+          </p:txBody>
+        </p:sp>
+      </p:grpSp>
+      <p:grpSp>
+        <p:nvGrpSpPr>
+          <p:cNvPr id="62" name="Group 61"/>
+          <p:cNvGrpSpPr/>
+          <p:nvPr/>
+        </p:nvGrpSpPr>
+        <p:grpSpPr>
+          <a:xfrm>
+            <a:off x="11376872" y="31477260"/>
+            <a:ext cx="4782086" cy="4769645"/>
+            <a:chOff x="7036604" y="29857435"/>
+            <a:chExt cx="7594600" cy="5518740"/>
+          </a:xfrm>
+        </p:grpSpPr>
+        <p:pic>
+          <p:nvPicPr>
+            <p:cNvPr id="55" name="Picture 54" descr="Screen Shot 2014-12-08 at 7.53.23 PM.png"/>
+            <p:cNvPicPr>
+              <a:picLocks noChangeAspect="1"/>
+            </p:cNvPicPr>
+            <p:nvPr/>
+          </p:nvPicPr>
+          <p:blipFill>
+            <a:blip r:embed="rId9">
+              <a:extLst>
+                <a:ext uri="{28A0092B-C50C-407E-A947-70E740481C1C}">
+                  <a14:useLocalDpi xmlns:a14="http://schemas.microsoft.com/office/drawing/2010/main" val="0"/>
+                </a:ext>
+              </a:extLst>
+            </a:blip>
+            <a:stretch>
+              <a:fillRect/>
+            </a:stretch>
+          </p:blipFill>
+          <p:spPr>
+            <a:xfrm>
+              <a:off x="7036604" y="29857435"/>
+              <a:ext cx="7594600" cy="5295900"/>
+            </a:xfrm>
+            <a:prstGeom prst="rect">
+              <a:avLst/>
+            </a:prstGeom>
+          </p:spPr>
+        </p:pic>
+        <p:sp>
+          <p:nvSpPr>
+            <p:cNvPr id="56" name="TextBox 55"/>
+            <p:cNvSpPr txBox="1"/>
+            <p:nvPr/>
+          </p:nvSpPr>
+          <p:spPr>
+            <a:xfrm>
+              <a:off x="12015632" y="34976065"/>
+              <a:ext cx="1723549" cy="400110"/>
+            </a:xfrm>
+            <a:prstGeom prst="rect">
+              <a:avLst/>
+            </a:prstGeom>
+            <a:noFill/>
+          </p:spPr>
+          <p:txBody>
+            <a:bodyPr wrap="none" rtlCol="0">
+              <a:spAutoFit/>
+            </a:bodyPr>
+            <a:lstStyle/>
+            <a:p>
+              <a:r>
+                <a:rPr lang="en-US" sz="2000" dirty="0" smtClean="0"/>
+                <a:t>Contact Modal</a:t>
+              </a:r>
+              <a:endParaRPr lang="en-US" sz="2000" dirty="0"/>
+            </a:p>
+          </p:txBody>
+        </p:sp>
+      </p:grpSp>
+      <p:grpSp>
+        <p:nvGrpSpPr>
+          <p:cNvPr id="65" name="Group 64"/>
+          <p:cNvGrpSpPr/>
+          <p:nvPr/>
+        </p:nvGrpSpPr>
+        <p:grpSpPr>
+          <a:xfrm>
+            <a:off x="1058688" y="31477261"/>
+            <a:ext cx="5111931" cy="4769644"/>
+            <a:chOff x="10039936" y="31868854"/>
+            <a:chExt cx="7620000" cy="4451410"/>
+          </a:xfrm>
+        </p:grpSpPr>
+        <p:pic>
+          <p:nvPicPr>
+            <p:cNvPr id="63" name="Picture 62" descr="Screen Shot 2014-12-08 at 7.54.20 PM.png"/>
+            <p:cNvPicPr>
+              <a:picLocks noChangeAspect="1"/>
+            </p:cNvPicPr>
+            <p:nvPr/>
+          </p:nvPicPr>
+          <p:blipFill>
+            <a:blip r:embed="rId10">
+              <a:extLst>
+                <a:ext uri="{28A0092B-C50C-407E-A947-70E740481C1C}">
+                  <a14:useLocalDpi xmlns:a14="http://schemas.microsoft.com/office/drawing/2010/main" val="0"/>
+                </a:ext>
+              </a:extLst>
+            </a:blip>
+            <a:stretch>
+              <a:fillRect/>
+            </a:stretch>
+          </p:blipFill>
+          <p:spPr>
+            <a:xfrm>
+              <a:off x="10039936" y="31868854"/>
+              <a:ext cx="7620000" cy="4051300"/>
+            </a:xfrm>
+            <a:prstGeom prst="rect">
+              <a:avLst/>
+            </a:prstGeom>
+          </p:spPr>
+        </p:pic>
+        <p:sp>
+          <p:nvSpPr>
+            <p:cNvPr id="64" name="TextBox 63"/>
+            <p:cNvSpPr txBox="1"/>
+            <p:nvPr/>
+          </p:nvSpPr>
+          <p:spPr>
+            <a:xfrm>
+              <a:off x="13705669" y="35920154"/>
+              <a:ext cx="2747843" cy="400110"/>
+            </a:xfrm>
+            <a:prstGeom prst="rect">
+              <a:avLst/>
+            </a:prstGeom>
+            <a:noFill/>
+          </p:spPr>
+          <p:txBody>
+            <a:bodyPr wrap="none" rtlCol="0">
+              <a:spAutoFit/>
+            </a:bodyPr>
+            <a:lstStyle/>
+            <a:p>
+              <a:r>
+                <a:rPr lang="en-US" sz="2000" dirty="0" smtClean="0"/>
+                <a:t>Change Password Modal</a:t>
+              </a:r>
+              <a:endParaRPr lang="en-US" sz="2000" dirty="0"/>
+            </a:p>
+          </p:txBody>
+        </p:sp>
+      </p:grpSp>
+      <p:grpSp>
+        <p:nvGrpSpPr>
+          <p:cNvPr id="68" name="Group 67"/>
+          <p:cNvGrpSpPr/>
+          <p:nvPr/>
+        </p:nvGrpSpPr>
+        <p:grpSpPr>
+          <a:xfrm>
+            <a:off x="11376872" y="26012888"/>
+            <a:ext cx="4782086" cy="4720963"/>
+            <a:chOff x="11343179" y="37425309"/>
+            <a:chExt cx="7632700" cy="4362510"/>
+          </a:xfrm>
+        </p:grpSpPr>
+        <p:pic>
+          <p:nvPicPr>
+            <p:cNvPr id="66" name="Picture 65" descr="Screen Shot 2014-12-08 at 7.55.12 PM.png"/>
+            <p:cNvPicPr>
+              <a:picLocks noChangeAspect="1"/>
+            </p:cNvPicPr>
+            <p:nvPr/>
+          </p:nvPicPr>
+          <p:blipFill>
+            <a:blip r:embed="rId11">
+              <a:extLst>
+                <a:ext uri="{28A0092B-C50C-407E-A947-70E740481C1C}">
+                  <a14:useLocalDpi xmlns:a14="http://schemas.microsoft.com/office/drawing/2010/main" val="0"/>
+                </a:ext>
+              </a:extLst>
+            </a:blip>
+            <a:stretch>
+              <a:fillRect/>
+            </a:stretch>
+          </p:blipFill>
+          <p:spPr>
+            <a:xfrm>
+              <a:off x="11343179" y="37425309"/>
+              <a:ext cx="7632700" cy="3962400"/>
+            </a:xfrm>
+            <a:prstGeom prst="rect">
+              <a:avLst/>
+            </a:prstGeom>
+          </p:spPr>
+        </p:pic>
+        <p:sp>
+          <p:nvSpPr>
+            <p:cNvPr id="67" name="TextBox 66"/>
+            <p:cNvSpPr txBox="1"/>
+            <p:nvPr/>
+          </p:nvSpPr>
+          <p:spPr>
+            <a:xfrm>
+              <a:off x="15498398" y="41387709"/>
+              <a:ext cx="2356985" cy="400110"/>
+            </a:xfrm>
+            <a:prstGeom prst="rect">
+              <a:avLst/>
+            </a:prstGeom>
+            <a:noFill/>
+          </p:spPr>
+          <p:txBody>
+            <a:bodyPr wrap="none" rtlCol="0">
+              <a:spAutoFit/>
+            </a:bodyPr>
+            <a:lstStyle/>
+            <a:p>
+              <a:r>
+                <a:rPr lang="en-US" sz="2000" dirty="0" smtClean="0"/>
+                <a:t>Create a Note Modal</a:t>
+              </a:r>
+              <a:endParaRPr lang="en-US" sz="2000" dirty="0"/>
+            </a:p>
+          </p:txBody>
+        </p:sp>
+      </p:grpSp>
+      <p:grpSp>
+        <p:nvGrpSpPr>
+          <p:cNvPr id="71" name="Group 70"/>
+          <p:cNvGrpSpPr/>
+          <p:nvPr/>
+        </p:nvGrpSpPr>
+        <p:grpSpPr>
+          <a:xfrm>
+            <a:off x="6170619" y="26003751"/>
+            <a:ext cx="5206253" cy="4730100"/>
+            <a:chOff x="10886746" y="11552758"/>
+            <a:chExt cx="7594600" cy="8246790"/>
+          </a:xfrm>
+        </p:grpSpPr>
+        <p:pic>
+          <p:nvPicPr>
+            <p:cNvPr id="69" name="Picture 68" descr="Screen Shot 2014-12-08 at 7.56.03 PM.png"/>
+            <p:cNvPicPr>
+              <a:picLocks noChangeAspect="1"/>
+            </p:cNvPicPr>
+            <p:nvPr/>
+          </p:nvPicPr>
+          <p:blipFill>
+            <a:blip r:embed="rId12">
+              <a:extLst>
+                <a:ext uri="{28A0092B-C50C-407E-A947-70E740481C1C}">
+                  <a14:useLocalDpi xmlns:a14="http://schemas.microsoft.com/office/drawing/2010/main" val="0"/>
+                </a:ext>
+              </a:extLst>
+            </a:blip>
+            <a:stretch>
+              <a:fillRect/>
+            </a:stretch>
+          </p:blipFill>
+          <p:spPr>
+            <a:xfrm>
+              <a:off x="10886746" y="11552758"/>
+              <a:ext cx="7594600" cy="7899400"/>
+            </a:xfrm>
+            <a:prstGeom prst="rect">
+              <a:avLst/>
+            </a:prstGeom>
+          </p:spPr>
+        </p:pic>
+        <p:sp>
+          <p:nvSpPr>
+            <p:cNvPr id="70" name="TextBox 69"/>
+            <p:cNvSpPr txBox="1"/>
+            <p:nvPr/>
+          </p:nvSpPr>
+          <p:spPr>
+            <a:xfrm>
+              <a:off x="15663305" y="19399438"/>
+              <a:ext cx="2082221" cy="400110"/>
+            </a:xfrm>
+            <a:prstGeom prst="rect">
+              <a:avLst/>
+            </a:prstGeom>
+            <a:noFill/>
+          </p:spPr>
+          <p:txBody>
+            <a:bodyPr wrap="none" rtlCol="0">
+              <a:spAutoFit/>
+            </a:bodyPr>
+            <a:lstStyle/>
+            <a:p>
+              <a:r>
+                <a:rPr lang="en-US" sz="2000" dirty="0" smtClean="0"/>
+                <a:t>Join a Class Modal</a:t>
+              </a:r>
+              <a:endParaRPr lang="en-US" sz="2000" dirty="0"/>
+            </a:p>
+          </p:txBody>
+        </p:sp>
+      </p:grpSp>
+      <p:grpSp>
+        <p:nvGrpSpPr>
+          <p:cNvPr id="74" name="Group 73"/>
+          <p:cNvGrpSpPr/>
+          <p:nvPr/>
+        </p:nvGrpSpPr>
+        <p:grpSpPr>
+          <a:xfrm>
+            <a:off x="1058688" y="26003751"/>
+            <a:ext cx="5064611" cy="4969796"/>
+            <a:chOff x="23413656" y="18050731"/>
+            <a:chExt cx="7620000" cy="6271477"/>
+          </a:xfrm>
+        </p:grpSpPr>
+        <p:pic>
+          <p:nvPicPr>
+            <p:cNvPr id="72" name="Picture 71" descr="Screen Shot 2014-12-08 at 7.56.57 PM.png"/>
+            <p:cNvPicPr>
+              <a:picLocks noChangeAspect="1"/>
+            </p:cNvPicPr>
+            <p:nvPr/>
+          </p:nvPicPr>
+          <p:blipFill>
+            <a:blip r:embed="rId13">
+              <a:extLst>
+                <a:ext uri="{28A0092B-C50C-407E-A947-70E740481C1C}">
+                  <a14:useLocalDpi xmlns:a14="http://schemas.microsoft.com/office/drawing/2010/main" val="0"/>
+                </a:ext>
+              </a:extLst>
+            </a:blip>
+            <a:stretch>
+              <a:fillRect/>
+            </a:stretch>
+          </p:blipFill>
+          <p:spPr>
+            <a:xfrm>
+              <a:off x="23413656" y="18050731"/>
+              <a:ext cx="7620000" cy="5969000"/>
+            </a:xfrm>
+            <a:prstGeom prst="rect">
+              <a:avLst/>
+            </a:prstGeom>
+          </p:spPr>
+        </p:pic>
+        <p:sp>
+          <p:nvSpPr>
+            <p:cNvPr id="73" name="TextBox 72"/>
+            <p:cNvSpPr txBox="1"/>
+            <p:nvPr/>
+          </p:nvSpPr>
+          <p:spPr>
+            <a:xfrm>
+              <a:off x="28123470" y="23922098"/>
+              <a:ext cx="2361744" cy="400110"/>
+            </a:xfrm>
+            <a:prstGeom prst="rect">
+              <a:avLst/>
+            </a:prstGeom>
+            <a:noFill/>
+          </p:spPr>
+          <p:txBody>
+            <a:bodyPr wrap="none" rtlCol="0">
+              <a:spAutoFit/>
+            </a:bodyPr>
+            <a:lstStyle/>
+            <a:p>
+              <a:r>
+                <a:rPr lang="en-US" sz="2000" dirty="0" smtClean="0"/>
+                <a:t>Create a Class Modal</a:t>
+              </a:r>
+              <a:endParaRPr lang="en-US" sz="2000" dirty="0"/>
+            </a:p>
+          </p:txBody>
+        </p:sp>
+      </p:grpSp>
+      <p:grpSp>
+        <p:nvGrpSpPr>
+          <p:cNvPr id="77" name="Group 76"/>
+          <p:cNvGrpSpPr/>
+          <p:nvPr/>
+        </p:nvGrpSpPr>
+        <p:grpSpPr>
+          <a:xfrm>
+            <a:off x="9594899" y="6934122"/>
+            <a:ext cx="6002380" cy="5312114"/>
+            <a:chOff x="3912703" y="15161241"/>
+            <a:chExt cx="6004079" cy="5600838"/>
+          </a:xfrm>
+        </p:grpSpPr>
+        <p:pic>
+          <p:nvPicPr>
+            <p:cNvPr id="75" name="Picture 74" descr="Screen Shot 2014-12-08 at 7.58.19 PM.png"/>
+            <p:cNvPicPr>
+              <a:picLocks noChangeAspect="1"/>
+            </p:cNvPicPr>
+            <p:nvPr/>
+          </p:nvPicPr>
+          <p:blipFill>
+            <a:blip r:embed="rId14">
+              <a:extLst>
+                <a:ext uri="{28A0092B-C50C-407E-A947-70E740481C1C}">
+                  <a14:useLocalDpi xmlns:a14="http://schemas.microsoft.com/office/drawing/2010/main" val="0"/>
+                </a:ext>
+              </a:extLst>
+            </a:blip>
+            <a:stretch>
+              <a:fillRect/>
+            </a:stretch>
+          </p:blipFill>
+          <p:spPr>
+            <a:xfrm>
+              <a:off x="3912703" y="15161241"/>
+              <a:ext cx="6002380" cy="5200727"/>
+            </a:xfrm>
+            <a:prstGeom prst="rect">
+              <a:avLst/>
+            </a:prstGeom>
+          </p:spPr>
+        </p:pic>
+        <p:sp>
+          <p:nvSpPr>
+            <p:cNvPr id="76" name="TextBox 75"/>
+            <p:cNvSpPr txBox="1"/>
+            <p:nvPr/>
+          </p:nvSpPr>
+          <p:spPr>
+            <a:xfrm>
+              <a:off x="7745269" y="20361969"/>
+              <a:ext cx="2171513" cy="400110"/>
+            </a:xfrm>
+            <a:prstGeom prst="rect">
+              <a:avLst/>
+            </a:prstGeom>
+            <a:noFill/>
+          </p:spPr>
+          <p:txBody>
+            <a:bodyPr wrap="none" rtlCol="0">
+              <a:spAutoFit/>
+            </a:bodyPr>
+            <a:lstStyle/>
+            <a:p>
+              <a:r>
+                <a:rPr lang="en-US" sz="2000" dirty="0" smtClean="0"/>
+                <a:t>Registration Modal</a:t>
+              </a:r>
+              <a:endParaRPr lang="en-US" sz="2000" dirty="0"/>
+            </a:p>
+          </p:txBody>
+        </p:sp>
+      </p:grpSp>
+      <p:sp>
+        <p:nvSpPr>
+          <p:cNvPr id="78" name="TextBox 77"/>
           <p:cNvSpPr txBox="1"/>
           <p:nvPr/>
         </p:nvSpPr>
         <p:spPr>
           <a:xfrm>
-            <a:off x="19202396" y="6293536"/>
-            <a:ext cx="13428658" cy="2862322"/>
+            <a:off x="1058688" y="23690439"/>
+            <a:ext cx="14315027" cy="2246769"/>
           </a:xfrm>
           <a:prstGeom prst="rect">
             <a:avLst/>
@@ -4654,29 +5577,98 @@
           <a:lstStyle/>
           <a:p>
             <a:r>
-              <a:rPr lang="en-US" sz="3600" b="1" dirty="0" smtClean="0"/>
-              <a:t>Use-Cases</a:t>
-            </a:r>
-          </a:p>
-          <a:p>
-            <a:r>
-              <a:rPr lang="en-US" sz="2400" dirty="0" smtClean="0"/>
-              <a:t>The app is geared towards the student.  The student has the ability to take notes, and share them collaboratively with other classmates.  Once a note is created, the student can compare their notes with other classmates in order to fill in a spot they missed, or to insert a better note.  The student can also split their notes into different portions, edit their note portions, delete their note portions, or combine their note portions.  As a class creator, you have the ability to remove inappropriate users from your class, or to change the information pertaining to the class  </a:t>
-            </a:r>
-            <a:endParaRPr lang="en-US" sz="2400" dirty="0"/>
-          </a:p>
-        </p:txBody>
-      </p:sp>
-      <p:sp>
-        <p:nvSpPr>
-          <p:cNvPr id="59" name="TextBox 58"/>
+              <a:rPr lang="en-US" sz="2800" dirty="0" smtClean="0"/>
+              <a:t>From the Document Screen (above) you can access almost all of the features of OpenNote.  For example, from this screen, you can contact the management of OpenNote, you can change your password,  you can create a new note, create a new class, join a class, you can manage the classes that you are an admin, or you can view your profile.  These modals are all displayed below.</a:t>
+            </a:r>
+            <a:endParaRPr lang="en-US" sz="2800" dirty="0"/>
+          </a:p>
+        </p:txBody>
+      </p:sp>
+      <p:grpSp>
+        <p:nvGrpSpPr>
+          <p:cNvPr id="81" name="Group 80"/>
+          <p:cNvGrpSpPr/>
+          <p:nvPr/>
+        </p:nvGrpSpPr>
+        <p:grpSpPr>
+          <a:xfrm>
+            <a:off x="20826165" y="23444250"/>
+            <a:ext cx="7326238" cy="4910711"/>
+            <a:chOff x="16157719" y="28919179"/>
+            <a:chExt cx="7607300" cy="5225640"/>
+          </a:xfrm>
+        </p:grpSpPr>
+        <p:pic>
+          <p:nvPicPr>
+            <p:cNvPr id="79" name="Picture 78" descr="Screen Shot 2014-12-08 at 8.15.46 PM.png"/>
+            <p:cNvPicPr>
+              <a:picLocks noChangeAspect="1"/>
+            </p:cNvPicPr>
+            <p:nvPr/>
+          </p:nvPicPr>
+          <p:blipFill>
+            <a:blip r:embed="rId15">
+              <a:extLst>
+                <a:ext uri="{28A0092B-C50C-407E-A947-70E740481C1C}">
+                  <a14:useLocalDpi xmlns:a14="http://schemas.microsoft.com/office/drawing/2010/main" val="0"/>
+                </a:ext>
+              </a:extLst>
+            </a:blip>
+            <a:stretch>
+              <a:fillRect/>
+            </a:stretch>
+          </p:blipFill>
+          <p:spPr>
+            <a:xfrm>
+              <a:off x="16157719" y="28919179"/>
+              <a:ext cx="7607300" cy="5029200"/>
+            </a:xfrm>
+            <a:prstGeom prst="rect">
+              <a:avLst/>
+            </a:prstGeom>
+          </p:spPr>
+        </p:pic>
+        <p:sp>
+          <p:nvSpPr>
+            <p:cNvPr id="80" name="TextBox 79"/>
+            <p:cNvSpPr txBox="1"/>
+            <p:nvPr/>
+          </p:nvSpPr>
+          <p:spPr>
+            <a:xfrm>
+              <a:off x="21997030" y="33744709"/>
+              <a:ext cx="1678715" cy="400110"/>
+            </a:xfrm>
+            <a:prstGeom prst="rect">
+              <a:avLst/>
+            </a:prstGeom>
+            <a:noFill/>
+          </p:spPr>
+          <p:txBody>
+            <a:bodyPr wrap="none" rtlCol="0">
+              <a:spAutoFit/>
+            </a:bodyPr>
+            <a:lstStyle/>
+            <a:p>
+              <a:r>
+                <a:rPr lang="en-US" sz="2000" dirty="0" smtClean="0"/>
+                <a:t>Block Diagram</a:t>
+              </a:r>
+              <a:endParaRPr lang="en-US" sz="2000" dirty="0"/>
+            </a:p>
+          </p:txBody>
+        </p:sp>
+      </p:grpSp>
+      <p:sp>
+        <p:nvSpPr>
+          <p:cNvPr id="82" name="TextBox 81"/>
           <p:cNvSpPr txBox="1"/>
           <p:nvPr/>
         </p:nvSpPr>
         <p:spPr>
           <a:xfrm>
-            <a:off x="713854" y="6084631"/>
-            <a:ext cx="13970192" cy="4185762"/>
+            <a:off x="17522816" y="32835637"/>
+            <a:ext cx="14092484" cy="4031873"/>
           </a:xfrm>
           <a:prstGeom prst="rect">
             <a:avLst/>
@@ -4690,158 +5682,142 @@
           <a:lstStyle/>
           <a:p>
             <a:r>
-              <a:rPr lang="en-US" sz="3600" b="1" dirty="0" smtClean="0"/>
-              <a:t>Actors</a:t>
-            </a:r>
-          </a:p>
-          <a:p>
-            <a:r>
-              <a:rPr lang="en-US" sz="2400" dirty="0" err="1" smtClean="0"/>
-              <a:t>OpenNote</a:t>
+              <a:rPr lang="en-US" sz="3200" b="1" dirty="0" smtClean="0"/>
+              <a:t>Other Features</a:t>
+            </a:r>
+          </a:p>
+          <a:p>
+            <a:r>
+              <a:rPr lang="en-US" sz="2800" dirty="0" smtClean="0"/>
+              <a:t>OpenNote has other features that have not been mentioned.  As a OpenNote user, you have the ability to synchronously compare your notes with other users in your class from similar time frames.  While taking notes, if you have two notes that are related, you can join them together into one thought, or do the latter, and split a thought into two thoughts.  Another feature is the flashcard feature, in which the user can flip the thought over, write a keyword and use this effect for studying.  A final feature is the star feature in which the user can star an important note, and at the end of the session, they can print a study guide, consisting of all of the starred elements on one page to make it easy for studying the key points.</a:t>
             </a:r>
             <a:r>
               <a:rPr lang="en-US" sz="2400" dirty="0" smtClean="0"/>
-              <a:t> consists of three different types of actors:</a:t>
-            </a:r>
-          </a:p>
-          <a:p>
-            <a:r>
-              <a:rPr lang="en-US" sz="2400" dirty="0" smtClean="0"/>
-              <a:t>	Student – Every user that uses the app to take notes is considered a student.  They are the users that use the app to keep their </a:t>
-            </a:r>
-            <a:r>
-              <a:rPr lang="en-US" sz="2400" dirty="0" err="1" smtClean="0"/>
-              <a:t>ntoes</a:t>
-            </a:r>
-            <a:r>
-              <a:rPr lang="en-US" sz="2400" dirty="0" smtClean="0"/>
-              <a:t> organized and work together collaboratively with other students to create the best possible notes.</a:t>
-            </a:r>
-          </a:p>
-          <a:p>
-            <a:r>
-              <a:rPr lang="en-US" sz="2400" dirty="0" smtClean="0"/>
-              <a:t>	</a:t>
-            </a:r>
-            <a:r>
-              <a:rPr lang="en-US" sz="2400" dirty="0" smtClean="0"/>
-              <a:t>Class </a:t>
-            </a:r>
-            <a:r>
-              <a:rPr lang="en-US" sz="2400" dirty="0" smtClean="0"/>
-              <a:t>Creator – The user that has originally created the class.  This user is able to remove users from their class, as well as delete the class they created if they like.</a:t>
-            </a:r>
-          </a:p>
-          <a:p>
-            <a:endParaRPr lang="en-US" dirty="0"/>
-          </a:p>
-        </p:txBody>
-      </p:sp>
-      <p:sp>
-        <p:nvSpPr>
-          <p:cNvPr id="60" name="TextBox 59"/>
-          <p:cNvSpPr txBox="1"/>
-          <p:nvPr/>
-        </p:nvSpPr>
-        <p:spPr>
-          <a:xfrm>
-            <a:off x="9629731" y="21214682"/>
-            <a:ext cx="13141884" cy="2492990"/>
-          </a:xfrm>
-          <a:prstGeom prst="rect">
-            <a:avLst/>
-          </a:prstGeom>
-          <a:noFill/>
-        </p:spPr>
-        <p:txBody>
-          <a:bodyPr wrap="square" rtlCol="0">
-            <a:spAutoFit/>
-          </a:bodyPr>
-          <a:lstStyle/>
-          <a:p>
-            <a:r>
-              <a:rPr lang="en-US" sz="3600" b="1" dirty="0" smtClean="0"/>
-              <a:t>Team Info</a:t>
-            </a:r>
-          </a:p>
-          <a:p>
-            <a:r>
-              <a:rPr lang="en-US" sz="2400" dirty="0" smtClean="0"/>
-              <a:t>Coming into this project, none of our group members knew too much about </a:t>
-            </a:r>
-            <a:r>
-              <a:rPr lang="en-US" sz="2400" dirty="0" err="1" smtClean="0"/>
-              <a:t>eachother</a:t>
-            </a:r>
-            <a:r>
-              <a:rPr lang="en-US" sz="2400" dirty="0" smtClean="0"/>
-              <a:t>.  But having spent a whole semester together we have learned a lot, and grown to become very good friends.  We learned a great deal about the process involved in making an app, as well as how important communication is.  It isn’t always opportune to meet for everyone so it is extremely important to split up work and collaborate often.</a:t>
+              <a:t> </a:t>
             </a:r>
             <a:endParaRPr lang="en-US" sz="2400" dirty="0"/>
-          </a:p>
-        </p:txBody>
-      </p:sp>
-      <p:sp>
-        <p:nvSpPr>
-          <p:cNvPr id="61" name="TextBox 60"/>
-          <p:cNvSpPr txBox="1"/>
-          <p:nvPr/>
-        </p:nvSpPr>
-        <p:spPr>
-          <a:xfrm>
-            <a:off x="19583942" y="37137386"/>
-            <a:ext cx="12259970" cy="1415772"/>
-          </a:xfrm>
-          <a:prstGeom prst="rect">
-            <a:avLst/>
-          </a:prstGeom>
-          <a:noFill/>
-        </p:spPr>
-        <p:txBody>
-          <a:bodyPr wrap="square" rtlCol="0">
-            <a:spAutoFit/>
-          </a:bodyPr>
-          <a:lstStyle/>
-          <a:p>
-            <a:pPr algn="ctr"/>
-            <a:r>
-              <a:rPr lang="en-US" dirty="0" smtClean="0"/>
-              <a:t>Insert team picture</a:t>
-            </a:r>
-            <a:endParaRPr lang="en-US" dirty="0"/>
           </a:p>
         </p:txBody>
       </p:sp>
       <p:pic>
         <p:nvPicPr>
-          <p:cNvPr id="9" name="Picture 8" descr="Screen Shot 2014-12-07 at 11.56.51 PM.png"/>
+          <p:cNvPr id="83" name="Picture 82"/>
           <p:cNvPicPr>
             <a:picLocks noChangeAspect="1"/>
           </p:cNvPicPr>
           <p:nvPr/>
         </p:nvPicPr>
         <p:blipFill>
-          <a:blip r:embed="rId5">
-            <a:extLst>
-              <a:ext uri="{28A0092B-C50C-407E-A947-70E740481C1C}">
-                <a14:useLocalDpi xmlns:a14="http://schemas.microsoft.com/office/drawing/2010/main" val="0"/>
-              </a:ext>
-            </a:extLst>
-          </a:blip>
+          <a:blip r:embed="rId16"/>
           <a:stretch>
             <a:fillRect/>
           </a:stretch>
         </p:blipFill>
         <p:spPr>
           <a:xfrm>
-            <a:off x="18342907" y="25385606"/>
-            <a:ext cx="7962900" cy="5778500"/>
+            <a:off x="20024402" y="353913"/>
+            <a:ext cx="11590897" cy="4064000"/>
           </a:xfrm>
           <a:prstGeom prst="rect">
             <a:avLst/>
           </a:prstGeom>
         </p:spPr>
       </p:pic>
+      <p:pic>
+        <p:nvPicPr>
+          <p:cNvPr id="84" name="Picture 83"/>
+          <p:cNvPicPr>
+            <a:picLocks noChangeAspect="1"/>
+          </p:cNvPicPr>
+          <p:nvPr/>
+        </p:nvPicPr>
+        <p:blipFill>
+          <a:blip r:embed="rId16"/>
+          <a:stretch>
+            <a:fillRect/>
+          </a:stretch>
+        </p:blipFill>
+        <p:spPr>
+          <a:xfrm rot="10800000">
+            <a:off x="1298910" y="353913"/>
+            <a:ext cx="11590897" cy="4064000"/>
+          </a:xfrm>
+          <a:prstGeom prst="rect">
+            <a:avLst/>
+          </a:prstGeom>
+        </p:spPr>
+      </p:pic>
+      <p:cxnSp>
+        <p:nvCxnSpPr>
+          <p:cNvPr id="87" name="Straight Connector 86"/>
+          <p:cNvCxnSpPr/>
+          <p:nvPr/>
+        </p:nvCxnSpPr>
+        <p:spPr>
+          <a:xfrm flipH="1">
+            <a:off x="16459201" y="4248749"/>
+            <a:ext cx="1" cy="39060076"/>
+          </a:xfrm>
+          <a:prstGeom prst="line">
+            <a:avLst/>
+          </a:prstGeom>
+          <a:ln>
+            <a:solidFill>
+              <a:schemeClr val="tx1"/>
+            </a:solidFill>
+          </a:ln>
+        </p:spPr>
+        <p:style>
+          <a:lnRef idx="2">
+            <a:schemeClr val="accent1"/>
+          </a:lnRef>
+          <a:fillRef idx="0">
+            <a:schemeClr val="accent1"/>
+          </a:fillRef>
+          <a:effectRef idx="1">
+            <a:schemeClr val="accent1"/>
+          </a:effectRef>
+          <a:fontRef idx="minor">
+            <a:schemeClr val="tx1"/>
+          </a:fontRef>
+        </p:style>
+      </p:cxnSp>
+      <p:sp>
+        <p:nvSpPr>
+          <p:cNvPr id="90" name="TextBox 89"/>
+          <p:cNvSpPr txBox="1"/>
+          <p:nvPr/>
+        </p:nvSpPr>
+        <p:spPr>
+          <a:xfrm>
+            <a:off x="17645106" y="28087775"/>
+            <a:ext cx="14092484" cy="4893648"/>
+          </a:xfrm>
+          <a:prstGeom prst="rect">
+            <a:avLst/>
+          </a:prstGeom>
+          <a:noFill/>
+        </p:spPr>
+        <p:txBody>
+          <a:bodyPr wrap="square" rtlCol="0">
+            <a:spAutoFit/>
+          </a:bodyPr>
+          <a:lstStyle/>
+          <a:p>
+            <a:r>
+              <a:rPr lang="en-US" sz="3200" b="1" dirty="0" smtClean="0"/>
+              <a:t>Lessons Learnt</a:t>
+            </a:r>
+          </a:p>
+          <a:p>
+            <a:r>
+              <a:rPr lang="en-US" sz="2800" dirty="0" smtClean="0"/>
+              <a:t>From this project, we have learned a great deal about the process involved in starting from scratch, and working to completion on a web app.  We learned that communication is the single most important tool in working effectively.  We have seen this in such instances as group members working on the same feature of the app, and then running into merge conflicts.  It is also key in finding a solution to a problem you just can’t seem to fix on your own.  With group members of all different skill levels, and different backgrounds it is key to understand each members strengths and work accordingly.  The biggest thing we learnt is that you will not succeed if you don’t try.  We created our app using firebase.  No one in our group was familiar with firebase when we started, but with practice we all learned a great deal and it is a great tool that can be used.</a:t>
+            </a:r>
+            <a:endParaRPr lang="en-US" sz="2800" dirty="0"/>
+          </a:p>
+        </p:txBody>
+      </p:sp>
     </p:spTree>
     <p:extLst>
       <p:ext uri="{BB962C8B-B14F-4D97-AF65-F5344CB8AC3E}">

</xml_diff>

<commit_message>
Poster and Random stuff apparently
</commit_message>
<xml_diff>
--- a/OpenNote Poster.pptx
+++ b/OpenNote Poster.pptx
@@ -104,6 +104,22 @@
       </a:defRPr>
     </a:lvl9pPr>
   </p:defaultTextStyle>
+  <p:extLst>
+    <p:ext uri="{EFAFB233-063F-42B5-8137-9DF3F51BA10A}">
+      <p15:sldGuideLst xmlns:p15="http://schemas.microsoft.com/office/powerpoint/2012/main">
+        <p15:guide id="1" orient="horz" pos="13824">
+          <p15:clr>
+            <a:srgbClr val="A4A3A4"/>
+          </p15:clr>
+        </p15:guide>
+        <p15:guide id="2" pos="10368">
+          <p15:clr>
+            <a:srgbClr val="A4A3A4"/>
+          </p15:clr>
+        </p15:guide>
+      </p15:sldGuideLst>
+    </p:ext>
+  </p:extLst>
 </p:presentation>
 </file>
 
@@ -288,7 +304,7 @@
           <a:p>
             <a:fld id="{A5D0B455-88A9-8143-8BEA-7DBBC3C41270}" type="datetimeFigureOut">
               <a:rPr lang="en-US" smtClean="0"/>
-              <a:t>12/7/14</a:t>
+              <a:t>12/9/2014</a:t>
             </a:fld>
             <a:endParaRPr lang="en-US"/>
           </a:p>
@@ -458,7 +474,7 @@
           <a:p>
             <a:fld id="{A5D0B455-88A9-8143-8BEA-7DBBC3C41270}" type="datetimeFigureOut">
               <a:rPr lang="en-US" smtClean="0"/>
-              <a:t>12/7/14</a:t>
+              <a:t>12/9/2014</a:t>
             </a:fld>
             <a:endParaRPr lang="en-US"/>
           </a:p>
@@ -638,7 +654,7 @@
           <a:p>
             <a:fld id="{A5D0B455-88A9-8143-8BEA-7DBBC3C41270}" type="datetimeFigureOut">
               <a:rPr lang="en-US" smtClean="0"/>
-              <a:t>12/7/14</a:t>
+              <a:t>12/9/2014</a:t>
             </a:fld>
             <a:endParaRPr lang="en-US"/>
           </a:p>
@@ -808,7 +824,7 @@
           <a:p>
             <a:fld id="{A5D0B455-88A9-8143-8BEA-7DBBC3C41270}" type="datetimeFigureOut">
               <a:rPr lang="en-US" smtClean="0"/>
-              <a:t>12/7/14</a:t>
+              <a:t>12/9/2014</a:t>
             </a:fld>
             <a:endParaRPr lang="en-US"/>
           </a:p>
@@ -1054,7 +1070,7 @@
           <a:p>
             <a:fld id="{A5D0B455-88A9-8143-8BEA-7DBBC3C41270}" type="datetimeFigureOut">
               <a:rPr lang="en-US" smtClean="0"/>
-              <a:t>12/7/14</a:t>
+              <a:t>12/9/2014</a:t>
             </a:fld>
             <a:endParaRPr lang="en-US"/>
           </a:p>
@@ -1342,7 +1358,7 @@
           <a:p>
             <a:fld id="{A5D0B455-88A9-8143-8BEA-7DBBC3C41270}" type="datetimeFigureOut">
               <a:rPr lang="en-US" smtClean="0"/>
-              <a:t>12/7/14</a:t>
+              <a:t>12/9/2014</a:t>
             </a:fld>
             <a:endParaRPr lang="en-US"/>
           </a:p>
@@ -1769,7 +1785,7 @@
           <a:p>
             <a:fld id="{A5D0B455-88A9-8143-8BEA-7DBBC3C41270}" type="datetimeFigureOut">
               <a:rPr lang="en-US" smtClean="0"/>
-              <a:t>12/7/14</a:t>
+              <a:t>12/9/2014</a:t>
             </a:fld>
             <a:endParaRPr lang="en-US"/>
           </a:p>
@@ -1887,7 +1903,7 @@
           <a:p>
             <a:fld id="{A5D0B455-88A9-8143-8BEA-7DBBC3C41270}" type="datetimeFigureOut">
               <a:rPr lang="en-US" smtClean="0"/>
-              <a:t>12/7/14</a:t>
+              <a:t>12/9/2014</a:t>
             </a:fld>
             <a:endParaRPr lang="en-US"/>
           </a:p>
@@ -1982,7 +1998,7 @@
           <a:p>
             <a:fld id="{A5D0B455-88A9-8143-8BEA-7DBBC3C41270}" type="datetimeFigureOut">
               <a:rPr lang="en-US" smtClean="0"/>
-              <a:t>12/7/14</a:t>
+              <a:t>12/9/2014</a:t>
             </a:fld>
             <a:endParaRPr lang="en-US"/>
           </a:p>
@@ -2259,7 +2275,7 @@
           <a:p>
             <a:fld id="{A5D0B455-88A9-8143-8BEA-7DBBC3C41270}" type="datetimeFigureOut">
               <a:rPr lang="en-US" smtClean="0"/>
-              <a:t>12/7/14</a:t>
+              <a:t>12/9/2014</a:t>
             </a:fld>
             <a:endParaRPr lang="en-US"/>
           </a:p>
@@ -2512,7 +2528,7 @@
           <a:p>
             <a:fld id="{A5D0B455-88A9-8143-8BEA-7DBBC3C41270}" type="datetimeFigureOut">
               <a:rPr lang="en-US" smtClean="0"/>
-              <a:t>12/7/14</a:t>
+              <a:t>12/9/2014</a:t>
             </a:fld>
             <a:endParaRPr lang="en-US"/>
           </a:p>
@@ -2725,7 +2741,7 @@
           <a:p>
             <a:fld id="{A5D0B455-88A9-8143-8BEA-7DBBC3C41270}" type="datetimeFigureOut">
               <a:rPr lang="en-US" smtClean="0"/>
-              <a:t>12/7/14</a:t>
+              <a:t>12/9/2014</a:t>
             </a:fld>
             <a:endParaRPr lang="en-US"/>
           </a:p>
@@ -3100,6 +3116,30 @@
           <a:chExt cx="0" cy="0"/>
         </a:xfrm>
       </p:grpSpPr>
+      <p:pic>
+        <p:nvPicPr>
+          <p:cNvPr id="2" name="Picture 1"/>
+          <p:cNvPicPr>
+            <a:picLocks noChangeAspect="1"/>
+          </p:cNvPicPr>
+          <p:nvPr/>
+        </p:nvPicPr>
+        <p:blipFill>
+          <a:blip r:embed="rId2"/>
+          <a:stretch>
+            <a:fillRect/>
+          </a:stretch>
+        </p:blipFill>
+        <p:spPr>
+          <a:xfrm>
+            <a:off x="713854" y="84825"/>
+            <a:ext cx="9229725" cy="3733800"/>
+          </a:xfrm>
+          <a:prstGeom prst="rect">
+            <a:avLst/>
+          </a:prstGeom>
+        </p:spPr>
+      </p:pic>
       <p:cxnSp>
         <p:nvCxnSpPr>
           <p:cNvPr id="53" name="Straight Connector 52"/>
@@ -3222,7 +3262,7 @@
         </p:nvCxnSpPr>
         <p:spPr>
           <a:xfrm flipV="1">
-            <a:off x="-18534" y="8362178"/>
+            <a:off x="179855" y="8988922"/>
             <a:ext cx="32918400" cy="133687"/>
           </a:xfrm>
           <a:prstGeom prst="line">
@@ -4134,7 +4174,7 @@
         </p:nvCxnSpPr>
         <p:spPr>
           <a:xfrm flipV="1">
-            <a:off x="-18534" y="42635533"/>
+            <a:off x="86935" y="42445631"/>
             <a:ext cx="32918400" cy="133687"/>
           </a:xfrm>
           <a:prstGeom prst="line">
@@ -4172,7 +4212,7 @@
         </p:nvCxnSpPr>
         <p:spPr>
           <a:xfrm flipV="1">
-            <a:off x="-18534" y="5506066"/>
+            <a:off x="-57994" y="5606051"/>
             <a:ext cx="32918400" cy="133687"/>
           </a:xfrm>
           <a:prstGeom prst="line">
@@ -4210,8 +4250,8 @@
         </p:nvSpPr>
         <p:spPr>
           <a:xfrm>
-            <a:off x="12246598" y="353913"/>
-            <a:ext cx="8436545" cy="3724097"/>
+            <a:off x="19445894" y="353913"/>
+            <a:ext cx="12398018" cy="3477875"/>
           </a:xfrm>
           <a:prstGeom prst="rect">
             <a:avLst/>
@@ -4226,92 +4266,101 @@
           <a:p>
             <a:pPr algn="ctr"/>
             <a:r>
-              <a:rPr lang="en-US" sz="9600" b="1" dirty="0" err="1" smtClean="0"/>
-              <a:t>O</a:t>
-            </a:r>
-            <a:r>
-              <a:rPr lang="en-US" sz="9600" b="1" dirty="0" err="1" smtClean="0">
-                <a:solidFill>
-                  <a:srgbClr val="0000FF"/>
-                </a:solidFill>
+              <a:rPr lang="en-US" sz="4400" b="1" dirty="0" smtClean="0">
+                <a:latin typeface="Segoe UI" panose="020B0502040204020203" pitchFamily="34" charset="0"/>
+                <a:ea typeface="Segoe UI" panose="020B0502040204020203" pitchFamily="34" charset="0"/>
+                <a:cs typeface="Segoe UI" panose="020B0502040204020203" pitchFamily="34" charset="0"/>
               </a:rPr>
-              <a:t>pen</a:t>
-            </a:r>
-            <a:r>
-              <a:rPr lang="en-US" sz="9600" b="1" dirty="0" err="1" smtClean="0"/>
-              <a:t>N</a:t>
-            </a:r>
-            <a:r>
-              <a:rPr lang="en-US" sz="9600" b="1" dirty="0" err="1" smtClean="0">
-                <a:solidFill>
-                  <a:srgbClr val="0000FF"/>
-                </a:solidFill>
+              <a:t>COM S 309 – Group R17</a:t>
+            </a:r>
+            <a:endParaRPr lang="en-US" sz="4400" b="1" dirty="0" smtClean="0">
+              <a:latin typeface="Segoe UI" panose="020B0502040204020203" pitchFamily="34" charset="0"/>
+              <a:ea typeface="Segoe UI" panose="020B0502040204020203" pitchFamily="34" charset="0"/>
+              <a:cs typeface="Segoe UI" panose="020B0502040204020203" pitchFamily="34" charset="0"/>
+            </a:endParaRPr>
+          </a:p>
+          <a:p>
+            <a:pPr algn="ctr"/>
+            <a:r>
+              <a:rPr lang="en-US" sz="4400" dirty="0" smtClean="0">
+                <a:latin typeface="Segoe UI" panose="020B0502040204020203" pitchFamily="34" charset="0"/>
+                <a:ea typeface="Segoe UI" panose="020B0502040204020203" pitchFamily="34" charset="0"/>
+                <a:cs typeface="Segoe UI" panose="020B0502040204020203" pitchFamily="34" charset="0"/>
               </a:rPr>
-              <a:t>ote</a:t>
-            </a:r>
-            <a:endParaRPr lang="en-US" sz="9600" b="1" dirty="0" smtClean="0">
-              <a:solidFill>
-                <a:srgbClr val="0000FF"/>
-              </a:solidFill>
+              <a:t>Kim </a:t>
+            </a:r>
+            <a:r>
+              <a:rPr lang="en-US" sz="4400" dirty="0" err="1" smtClean="0">
+                <a:latin typeface="Segoe UI" panose="020B0502040204020203" pitchFamily="34" charset="0"/>
+                <a:ea typeface="Segoe UI" panose="020B0502040204020203" pitchFamily="34" charset="0"/>
+                <a:cs typeface="Segoe UI" panose="020B0502040204020203" pitchFamily="34" charset="0"/>
+              </a:rPr>
+              <a:t>Booe</a:t>
+            </a:r>
+            <a:endParaRPr lang="en-US" sz="4400" dirty="0" smtClean="0">
+              <a:latin typeface="Segoe UI" panose="020B0502040204020203" pitchFamily="34" charset="0"/>
+              <a:ea typeface="Segoe UI" panose="020B0502040204020203" pitchFamily="34" charset="0"/>
+              <a:cs typeface="Segoe UI" panose="020B0502040204020203" pitchFamily="34" charset="0"/>
             </a:endParaRPr>
           </a:p>
           <a:p>
             <a:pPr algn="ctr"/>
             <a:r>
-              <a:rPr lang="en-US" sz="2000" dirty="0" smtClean="0"/>
-              <a:t>Created By:</a:t>
-            </a:r>
+              <a:rPr lang="en-US" sz="4400" dirty="0" smtClean="0">
+                <a:latin typeface="Segoe UI" panose="020B0502040204020203" pitchFamily="34" charset="0"/>
+                <a:ea typeface="Segoe UI" panose="020B0502040204020203" pitchFamily="34" charset="0"/>
+                <a:cs typeface="Segoe UI" panose="020B0502040204020203" pitchFamily="34" charset="0"/>
+              </a:rPr>
+              <a:t>Shaun Van </a:t>
+            </a:r>
+            <a:r>
+              <a:rPr lang="en-US" sz="4400" dirty="0" err="1" smtClean="0">
+                <a:latin typeface="Segoe UI" panose="020B0502040204020203" pitchFamily="34" charset="0"/>
+                <a:ea typeface="Segoe UI" panose="020B0502040204020203" pitchFamily="34" charset="0"/>
+                <a:cs typeface="Segoe UI" panose="020B0502040204020203" pitchFamily="34" charset="0"/>
+              </a:rPr>
+              <a:t>Weelden</a:t>
+            </a:r>
+            <a:endParaRPr lang="en-US" sz="4400" dirty="0" smtClean="0">
+              <a:latin typeface="Segoe UI" panose="020B0502040204020203" pitchFamily="34" charset="0"/>
+              <a:ea typeface="Segoe UI" panose="020B0502040204020203" pitchFamily="34" charset="0"/>
+              <a:cs typeface="Segoe UI" panose="020B0502040204020203" pitchFamily="34" charset="0"/>
+            </a:endParaRPr>
           </a:p>
           <a:p>
             <a:pPr algn="ctr"/>
             <a:r>
-              <a:rPr lang="en-US" sz="2000" dirty="0" smtClean="0"/>
-              <a:t>Kim </a:t>
-            </a:r>
-            <a:r>
-              <a:rPr lang="en-US" sz="2000" dirty="0" err="1" smtClean="0"/>
-              <a:t>Booe</a:t>
-            </a:r>
-            <a:endParaRPr lang="en-US" sz="2000" dirty="0" smtClean="0"/>
+              <a:rPr lang="en-US" sz="4400" dirty="0" smtClean="0">
+                <a:latin typeface="Segoe UI" panose="020B0502040204020203" pitchFamily="34" charset="0"/>
+                <a:ea typeface="Segoe UI" panose="020B0502040204020203" pitchFamily="34" charset="0"/>
+                <a:cs typeface="Segoe UI" panose="020B0502040204020203" pitchFamily="34" charset="0"/>
+              </a:rPr>
+              <a:t>Matthew Szpak</a:t>
+            </a:r>
           </a:p>
           <a:p>
             <a:pPr algn="ctr"/>
             <a:r>
-              <a:rPr lang="en-US" sz="2000" dirty="0" smtClean="0"/>
-              <a:t>Shaun Van </a:t>
-            </a:r>
-            <a:r>
-              <a:rPr lang="en-US" sz="2000" dirty="0" err="1" smtClean="0"/>
-              <a:t>Weelden</a:t>
-            </a:r>
-            <a:endParaRPr lang="en-US" sz="2000" dirty="0" smtClean="0"/>
-          </a:p>
-          <a:p>
-            <a:pPr algn="ctr"/>
-            <a:r>
-              <a:rPr lang="en-US" sz="2000" dirty="0" smtClean="0"/>
-              <a:t>Matthew Szpak</a:t>
-            </a:r>
-          </a:p>
-          <a:p>
-            <a:pPr algn="ctr"/>
-            <a:r>
-              <a:rPr lang="en-US" sz="2000" dirty="0" smtClean="0"/>
+              <a:rPr lang="en-US" sz="4400" dirty="0" smtClean="0">
+                <a:latin typeface="Segoe UI" panose="020B0502040204020203" pitchFamily="34" charset="0"/>
+                <a:ea typeface="Segoe UI" panose="020B0502040204020203" pitchFamily="34" charset="0"/>
+                <a:cs typeface="Segoe UI" panose="020B0502040204020203" pitchFamily="34" charset="0"/>
+              </a:rPr>
               <a:t>Alec </a:t>
             </a:r>
             <a:r>
-              <a:rPr lang="en-US" sz="2000" dirty="0" err="1" smtClean="0"/>
+              <a:rPr lang="en-US" sz="4400" dirty="0" err="1" smtClean="0">
+                <a:latin typeface="Segoe UI" panose="020B0502040204020203" pitchFamily="34" charset="0"/>
+                <a:ea typeface="Segoe UI" panose="020B0502040204020203" pitchFamily="34" charset="0"/>
+                <a:cs typeface="Segoe UI" panose="020B0502040204020203" pitchFamily="34" charset="0"/>
+              </a:rPr>
               <a:t>Poczatek</a:t>
             </a:r>
-            <a:endParaRPr lang="en-US" sz="2000" dirty="0" smtClean="0"/>
-          </a:p>
-          <a:p>
-            <a:pPr algn="ctr"/>
-            <a:r>
-              <a:rPr lang="en-US" sz="3600" dirty="0" smtClean="0"/>
-              <a:t>COM S 309 Fall 2014</a:t>
-            </a:r>
-            <a:endParaRPr lang="en-US" sz="3600" dirty="0"/>
+            <a:endParaRPr lang="en-US" sz="4400" dirty="0" smtClean="0">
+              <a:latin typeface="Segoe UI" panose="020B0502040204020203" pitchFamily="34" charset="0"/>
+              <a:ea typeface="Segoe UI" panose="020B0502040204020203" pitchFamily="34" charset="0"/>
+              <a:cs typeface="Segoe UI" panose="020B0502040204020203" pitchFamily="34" charset="0"/>
+            </a:endParaRPr>
           </a:p>
         </p:txBody>
       </p:sp>
@@ -4323,8 +4372,89 @@
         </p:nvSpPr>
         <p:spPr>
           <a:xfrm>
-            <a:off x="713854" y="4211697"/>
-            <a:ext cx="13970193" cy="2031325"/>
+            <a:off x="1594754" y="4811332"/>
+            <a:ext cx="14918875" cy="6703091"/>
+          </a:xfrm>
+          <a:prstGeom prst="rect">
+            <a:avLst/>
+          </a:prstGeom>
+          <a:solidFill>
+            <a:schemeClr val="bg1"/>
+          </a:solidFill>
+          <a:ln w="107950">
+            <a:solidFill>
+              <a:srgbClr val="0070C0"/>
+            </a:solidFill>
+          </a:ln>
+        </p:spPr>
+        <p:txBody>
+          <a:bodyPr wrap="square" tIns="548640" rtlCol="0">
+            <a:spAutoFit/>
+          </a:bodyPr>
+          <a:lstStyle/>
+          <a:p>
+            <a:r>
+              <a:rPr lang="en-US" sz="2800" dirty="0" smtClean="0"/>
+              <a:t>OpenNote brings taking notes in class to a whole different level! Not only do you have an easy way to take notes yourself, you now have an easy way to share those notes with your peers. </a:t>
+            </a:r>
+            <a:r>
+              <a:rPr lang="en-US" sz="2800" dirty="0"/>
+              <a:t/>
+            </a:r>
+            <a:br>
+              <a:rPr lang="en-US" sz="2800" dirty="0"/>
+            </a:br>
+            <a:r>
+              <a:rPr lang="en-US" sz="2800" dirty="0" smtClean="0"/>
+              <a:t/>
+            </a:r>
+            <a:br>
+              <a:rPr lang="en-US" sz="2800" dirty="0" smtClean="0"/>
+            </a:br>
+            <a:r>
+              <a:rPr lang="en-US" sz="2800" dirty="0" smtClean="0"/>
+              <a:t>Picture this, you are sitting in class taking notes when you realize you have totally spaced out and missed the last five minutes of discussion. You try and ask your neighbor to see what they wrote, but now you and your neighbor are even more distracted! </a:t>
+            </a:r>
+            <a:br>
+              <a:rPr lang="en-US" sz="2800" dirty="0" smtClean="0"/>
+            </a:br>
+            <a:r>
+              <a:rPr lang="en-US" sz="2800" dirty="0" smtClean="0"/>
+              <a:t/>
+            </a:r>
+            <a:br>
+              <a:rPr lang="en-US" sz="2800" dirty="0" smtClean="0"/>
+            </a:br>
+            <a:r>
+              <a:rPr lang="en-US" sz="2800" dirty="0" smtClean="0"/>
+              <a:t>OpenNote solves this issue and many more! We do real-time synchronization of your notes with the notes of your classmates so you can go back and review what notes your classmates were taking and add those notes to your own.</a:t>
+            </a:r>
+          </a:p>
+          <a:p>
+            <a:endParaRPr lang="en-US" sz="2800" dirty="0"/>
+          </a:p>
+          <a:p>
+            <a:r>
+              <a:rPr lang="en-US" sz="2800" dirty="0" smtClean="0"/>
+              <a:t>Taking notes online has other advantages too! You can create virtual flashcards in a single step, have full access to text formatting, and create helpful study guides in seconds.</a:t>
+            </a:r>
+            <a:endParaRPr lang="en-US" sz="2800" dirty="0"/>
+          </a:p>
+          <a:p>
+            <a:endParaRPr lang="en-US" sz="2800" dirty="0" smtClean="0"/>
+          </a:p>
+        </p:txBody>
+      </p:sp>
+      <p:sp>
+        <p:nvSpPr>
+          <p:cNvPr id="14" name="TextBox 13"/>
+          <p:cNvSpPr txBox="1"/>
+          <p:nvPr/>
+        </p:nvSpPr>
+        <p:spPr>
+          <a:xfrm>
+            <a:off x="31652687" y="43479665"/>
+            <a:ext cx="1200650" cy="400110"/>
           </a:xfrm>
           <a:prstGeom prst="rect">
             <a:avLst/>
@@ -4332,68 +4462,389 @@
           <a:noFill/>
         </p:spPr>
         <p:txBody>
+          <a:bodyPr wrap="none" rtlCol="0">
+            <a:spAutoFit/>
+          </a:bodyPr>
+          <a:lstStyle/>
+          <a:p>
+            <a:r>
+              <a:rPr lang="en-US" sz="2000" dirty="0" smtClean="0"/>
+              <a:t>Team R17</a:t>
+            </a:r>
+            <a:endParaRPr lang="en-US" sz="2000" dirty="0"/>
+          </a:p>
+        </p:txBody>
+      </p:sp>
+      <p:sp>
+        <p:nvSpPr>
+          <p:cNvPr id="59" name="TextBox 58"/>
+          <p:cNvSpPr txBox="1"/>
+          <p:nvPr/>
+        </p:nvSpPr>
+        <p:spPr>
+          <a:xfrm>
+            <a:off x="18520711" y="12990792"/>
+            <a:ext cx="13970192" cy="4185762"/>
+          </a:xfrm>
+          <a:prstGeom prst="rect">
+            <a:avLst/>
+          </a:prstGeom>
+          <a:noFill/>
+        </p:spPr>
+        <p:txBody>
           <a:bodyPr wrap="square" rtlCol="0">
             <a:spAutoFit/>
           </a:bodyPr>
           <a:lstStyle/>
           <a:p>
             <a:r>
+              <a:rPr lang="en-US" sz="3600" b="1" dirty="0" smtClean="0"/>
+              <a:t>Actors</a:t>
+            </a:r>
+          </a:p>
+          <a:p>
+            <a:r>
               <a:rPr lang="en-US" sz="2400" dirty="0" smtClean="0"/>
-              <a:t>Note taking has never been so much fun and collaborative before.  OpenNote’s Real-time synchronization technology allows students to not only save their own notes, but to add classmates and instructors notes as well.  When students take notes together the whole class benefits.</a:t>
-            </a:r>
-          </a:p>
-          <a:p>
-            <a:endParaRPr lang="en-US" sz="5400" dirty="0"/>
-          </a:p>
-        </p:txBody>
-      </p:sp>
-      <p:sp>
-        <p:nvSpPr>
-          <p:cNvPr id="6" name="TextBox 5"/>
-          <p:cNvSpPr txBox="1"/>
+              <a:t>OpenNote consists of three different types of actors:</a:t>
+            </a:r>
+          </a:p>
+          <a:p>
+            <a:r>
+              <a:rPr lang="en-US" sz="2400" dirty="0" smtClean="0"/>
+              <a:t>	Student – Every user that uses the app to take notes is considered a student.  They are the users that use the app to keep their </a:t>
+            </a:r>
+            <a:r>
+              <a:rPr lang="en-US" sz="2400" dirty="0" err="1" smtClean="0"/>
+              <a:t>ntoes</a:t>
+            </a:r>
+            <a:r>
+              <a:rPr lang="en-US" sz="2400" dirty="0" smtClean="0"/>
+              <a:t> organized and work together collaboratively with other students to create the best possible notes.</a:t>
+            </a:r>
+          </a:p>
+          <a:p>
+            <a:r>
+              <a:rPr lang="en-US" sz="2400" dirty="0" smtClean="0"/>
+              <a:t>	Class Creator – The user that has originally created the class.  This user is able to remove users from their class, as well as delete the class they created if they like.</a:t>
+            </a:r>
+          </a:p>
+          <a:p>
+            <a:endParaRPr lang="en-US" dirty="0"/>
+          </a:p>
+        </p:txBody>
+      </p:sp>
+      <p:pic>
+        <p:nvPicPr>
+          <p:cNvPr id="15" name="Picture 14"/>
+          <p:cNvPicPr>
+            <a:picLocks noChangeAspect="1"/>
+          </p:cNvPicPr>
           <p:nvPr/>
-        </p:nvSpPr>
+        </p:nvPicPr>
+        <p:blipFill>
+          <a:blip r:embed="rId3"/>
+          <a:stretch>
+            <a:fillRect/>
+          </a:stretch>
+        </p:blipFill>
         <p:spPr>
           <a:xfrm>
-            <a:off x="19202396" y="4029553"/>
-            <a:ext cx="13428658" cy="3077766"/>
+            <a:off x="10151407" y="96890"/>
+            <a:ext cx="8191500" cy="3267075"/>
           </a:xfrm>
           <a:prstGeom prst="rect">
             <a:avLst/>
           </a:prstGeom>
-          <a:noFill/>
-        </p:spPr>
-        <p:txBody>
-          <a:bodyPr wrap="square" rtlCol="0">
+        </p:spPr>
+      </p:pic>
+      <p:sp>
+        <p:nvSpPr>
+          <p:cNvPr id="22" name="Rounded Rectangle 21"/>
+          <p:cNvSpPr/>
+          <p:nvPr/>
+        </p:nvSpPr>
+        <p:spPr>
+          <a:xfrm>
+            <a:off x="2138522" y="4054862"/>
+            <a:ext cx="7805057" cy="962848"/>
+          </a:xfrm>
+          <a:prstGeom prst="roundRect">
+            <a:avLst/>
+          </a:prstGeom>
+        </p:spPr>
+        <p:style>
+          <a:lnRef idx="1">
+            <a:schemeClr val="accent1"/>
+          </a:lnRef>
+          <a:fillRef idx="3">
+            <a:schemeClr val="accent1"/>
+          </a:fillRef>
+          <a:effectRef idx="2">
+            <a:schemeClr val="accent1"/>
+          </a:effectRef>
+          <a:fontRef idx="minor">
+            <a:schemeClr val="lt1"/>
+          </a:fontRef>
+        </p:style>
+        <p:txBody>
+          <a:bodyPr rtlCol="0" anchor="ctr"/>
+          <a:lstStyle/>
+          <a:p>
+            <a:pPr algn="ctr"/>
+            <a:r>
+              <a:rPr lang="en-US" sz="6000" dirty="0" smtClean="0"/>
+              <a:t>Overview</a:t>
+            </a:r>
+            <a:endParaRPr lang="en-US" sz="6000" dirty="0"/>
+          </a:p>
+        </p:txBody>
+      </p:sp>
+      <p:sp>
+        <p:nvSpPr>
+          <p:cNvPr id="55" name="TextBox 54"/>
+          <p:cNvSpPr txBox="1"/>
+          <p:nvPr/>
+        </p:nvSpPr>
+        <p:spPr>
+          <a:xfrm>
+            <a:off x="1594754" y="12135422"/>
+            <a:ext cx="14918875" cy="24729847"/>
+          </a:xfrm>
+          <a:prstGeom prst="rect">
+            <a:avLst/>
+          </a:prstGeom>
+          <a:solidFill>
+            <a:schemeClr val="bg1"/>
+          </a:solidFill>
+          <a:ln w="107950">
+            <a:solidFill>
+              <a:srgbClr val="0070C0"/>
+            </a:solidFill>
+          </a:ln>
+        </p:spPr>
+        <p:txBody>
+          <a:bodyPr wrap="square" tIns="548640" rtlCol="0">
             <a:spAutoFit/>
           </a:bodyPr>
           <a:lstStyle/>
           <a:p>
-            <a:r>
-              <a:rPr lang="en-US" sz="3600" b="1" dirty="0" smtClean="0"/>
-              <a:t>User-Interfaces</a:t>
-            </a:r>
-          </a:p>
-          <a:p>
-            <a:r>
-              <a:rPr lang="en-US" sz="2400" dirty="0" smtClean="0"/>
-              <a:t>The user interface for the student and class creator are one in the same.  The only difference is that the class creator has more power within the app.  They can manage their classes by removing users or changing the class specs/information.</a:t>
-            </a:r>
-          </a:p>
-          <a:p>
-            <a:endParaRPr lang="en-US" dirty="0"/>
+            <a:endParaRPr lang="en-US" sz="2800" dirty="0" smtClean="0"/>
+          </a:p>
+          <a:p>
+            <a:endParaRPr lang="en-US" sz="2800" dirty="0"/>
+          </a:p>
+          <a:p>
+            <a:endParaRPr lang="en-US" sz="2800" dirty="0" smtClean="0"/>
+          </a:p>
+          <a:p>
+            <a:endParaRPr lang="en-US" sz="2800" dirty="0"/>
+          </a:p>
+          <a:p>
+            <a:endParaRPr lang="en-US" sz="2800" dirty="0" smtClean="0"/>
+          </a:p>
+          <a:p>
+            <a:endParaRPr lang="en-US" sz="2800" dirty="0"/>
+          </a:p>
+          <a:p>
+            <a:endParaRPr lang="en-US" sz="2800" dirty="0" smtClean="0"/>
+          </a:p>
+          <a:p>
+            <a:endParaRPr lang="en-US" sz="2800" dirty="0"/>
+          </a:p>
+          <a:p>
+            <a:endParaRPr lang="en-US" sz="2800" dirty="0" smtClean="0"/>
+          </a:p>
+          <a:p>
+            <a:endParaRPr lang="en-US" sz="2800" dirty="0"/>
+          </a:p>
+          <a:p>
+            <a:endParaRPr lang="en-US" sz="2800" dirty="0" smtClean="0"/>
+          </a:p>
+          <a:p>
+            <a:endParaRPr lang="en-US" sz="2800" dirty="0"/>
+          </a:p>
+          <a:p>
+            <a:endParaRPr lang="en-US" sz="2800" dirty="0" smtClean="0"/>
+          </a:p>
+          <a:p>
+            <a:endParaRPr lang="en-US" sz="2800" dirty="0"/>
+          </a:p>
+          <a:p>
+            <a:endParaRPr lang="en-US" sz="2800" dirty="0" smtClean="0"/>
+          </a:p>
+          <a:p>
+            <a:endParaRPr lang="en-US" sz="2800" dirty="0"/>
+          </a:p>
+          <a:p>
+            <a:endParaRPr lang="en-US" sz="2800" dirty="0" smtClean="0"/>
+          </a:p>
+          <a:p>
+            <a:endParaRPr lang="en-US" sz="2800" dirty="0"/>
+          </a:p>
+          <a:p>
+            <a:endParaRPr lang="en-US" sz="2800" dirty="0" smtClean="0"/>
+          </a:p>
+          <a:p>
+            <a:endParaRPr lang="en-US" sz="2800" dirty="0"/>
+          </a:p>
+          <a:p>
+            <a:endParaRPr lang="en-US" sz="2800" dirty="0" smtClean="0"/>
+          </a:p>
+          <a:p>
+            <a:endParaRPr lang="en-US" sz="2800" dirty="0"/>
+          </a:p>
+          <a:p>
+            <a:endParaRPr lang="en-US" sz="2800" dirty="0" smtClean="0"/>
+          </a:p>
+          <a:p>
+            <a:endParaRPr lang="en-US" sz="2800" dirty="0"/>
+          </a:p>
+          <a:p>
+            <a:endParaRPr lang="en-US" sz="2800" dirty="0" smtClean="0"/>
+          </a:p>
+          <a:p>
+            <a:endParaRPr lang="en-US" sz="2800" dirty="0"/>
+          </a:p>
+          <a:p>
+            <a:endParaRPr lang="en-US" sz="2800" dirty="0" smtClean="0"/>
+          </a:p>
+          <a:p>
+            <a:endParaRPr lang="en-US" sz="2800" dirty="0"/>
+          </a:p>
+          <a:p>
+            <a:endParaRPr lang="en-US" sz="2800" dirty="0" smtClean="0"/>
+          </a:p>
+          <a:p>
+            <a:endParaRPr lang="en-US" sz="2800" dirty="0"/>
+          </a:p>
+          <a:p>
+            <a:endParaRPr lang="en-US" sz="2800" dirty="0" smtClean="0"/>
+          </a:p>
+          <a:p>
+            <a:endParaRPr lang="en-US" sz="2800" dirty="0"/>
+          </a:p>
+          <a:p>
+            <a:endParaRPr lang="en-US" sz="2800" dirty="0" smtClean="0"/>
+          </a:p>
+          <a:p>
+            <a:endParaRPr lang="en-US" sz="2800" dirty="0"/>
+          </a:p>
+          <a:p>
+            <a:endParaRPr lang="en-US" sz="2800" dirty="0" smtClean="0"/>
+          </a:p>
+          <a:p>
+            <a:endParaRPr lang="en-US" sz="2800" dirty="0"/>
+          </a:p>
+          <a:p>
+            <a:endParaRPr lang="en-US" sz="2800" dirty="0" smtClean="0"/>
+          </a:p>
+          <a:p>
+            <a:endParaRPr lang="en-US" sz="2800" dirty="0"/>
+          </a:p>
+          <a:p>
+            <a:endParaRPr lang="en-US" sz="2800" dirty="0" smtClean="0"/>
+          </a:p>
+          <a:p>
+            <a:endParaRPr lang="en-US" sz="2800" dirty="0"/>
+          </a:p>
+          <a:p>
+            <a:endParaRPr lang="en-US" sz="2800" dirty="0" smtClean="0"/>
+          </a:p>
+          <a:p>
+            <a:endParaRPr lang="en-US" sz="2800" dirty="0"/>
+          </a:p>
+          <a:p>
+            <a:endParaRPr lang="en-US" sz="2800" dirty="0" smtClean="0"/>
+          </a:p>
+          <a:p>
+            <a:endParaRPr lang="en-US" sz="2800" dirty="0"/>
+          </a:p>
+          <a:p>
+            <a:endParaRPr lang="en-US" sz="2800" dirty="0" smtClean="0"/>
+          </a:p>
+          <a:p>
+            <a:endParaRPr lang="en-US" sz="2800" dirty="0"/>
+          </a:p>
+          <a:p>
+            <a:endParaRPr lang="en-US" sz="2800" dirty="0" smtClean="0"/>
+          </a:p>
+          <a:p>
+            <a:endParaRPr lang="en-US" sz="2800" dirty="0"/>
+          </a:p>
+          <a:p>
+            <a:endParaRPr lang="en-US" sz="2800" dirty="0" smtClean="0"/>
+          </a:p>
+          <a:p>
+            <a:endParaRPr lang="en-US" sz="2800" dirty="0"/>
+          </a:p>
+          <a:p>
+            <a:endParaRPr lang="en-US" sz="2800" dirty="0" smtClean="0"/>
+          </a:p>
+          <a:p>
+            <a:endParaRPr lang="en-US" sz="2800" dirty="0"/>
+          </a:p>
+          <a:p>
+            <a:endParaRPr lang="en-US" sz="2800" dirty="0" smtClean="0"/>
+          </a:p>
+          <a:p>
+            <a:endParaRPr lang="en-US" sz="2800" dirty="0"/>
+          </a:p>
+          <a:p>
+            <a:endParaRPr lang="en-US" sz="2800" dirty="0" smtClean="0"/>
+          </a:p>
+        </p:txBody>
+      </p:sp>
+      <p:sp>
+        <p:nvSpPr>
+          <p:cNvPr id="54" name="Rounded Rectangle 53"/>
+          <p:cNvSpPr/>
+          <p:nvPr/>
+        </p:nvSpPr>
+        <p:spPr>
+          <a:xfrm>
+            <a:off x="2201972" y="11752804"/>
+            <a:ext cx="7805057" cy="962848"/>
+          </a:xfrm>
+          <a:prstGeom prst="roundRect">
+            <a:avLst/>
+          </a:prstGeom>
+        </p:spPr>
+        <p:style>
+          <a:lnRef idx="1">
+            <a:schemeClr val="accent1"/>
+          </a:lnRef>
+          <a:fillRef idx="3">
+            <a:schemeClr val="accent1"/>
+          </a:fillRef>
+          <a:effectRef idx="2">
+            <a:schemeClr val="accent1"/>
+          </a:effectRef>
+          <a:fontRef idx="minor">
+            <a:schemeClr val="lt1"/>
+          </a:fontRef>
+        </p:style>
+        <p:txBody>
+          <a:bodyPr rtlCol="0" anchor="ctr"/>
+          <a:lstStyle/>
+          <a:p>
+            <a:pPr algn="ctr"/>
+            <a:r>
+              <a:rPr lang="en-US" sz="6000" dirty="0" smtClean="0"/>
+              <a:t>Screens</a:t>
+            </a:r>
+            <a:endParaRPr lang="en-US" sz="6000" dirty="0"/>
           </a:p>
         </p:txBody>
       </p:sp>
       <p:grpSp>
         <p:nvGrpSpPr>
-          <p:cNvPr id="3" name="Group 2"/>
+          <p:cNvPr id="64" name="Group 63"/>
           <p:cNvGrpSpPr/>
           <p:nvPr/>
         </p:nvGrpSpPr>
         <p:grpSpPr>
           <a:xfrm>
-            <a:off x="713854" y="11785330"/>
+            <a:off x="2805354" y="13224889"/>
             <a:ext cx="12345274" cy="8397456"/>
             <a:chOff x="1542164" y="26752284"/>
             <a:chExt cx="12345274" cy="8397456"/>
@@ -4401,14 +4852,14 @@
         </p:grpSpPr>
         <p:pic>
           <p:nvPicPr>
-            <p:cNvPr id="8" name="Picture 7" descr="Screen Shot 2014-12-07 at 4.27.45 PM.png"/>
+            <p:cNvPr id="65" name="Picture 64" descr="Screen Shot 2014-12-07 at 4.27.45 PM.png"/>
             <p:cNvPicPr>
               <a:picLocks noChangeAspect="1"/>
             </p:cNvPicPr>
             <p:nvPr/>
           </p:nvPicPr>
           <p:blipFill>
-            <a:blip r:embed="rId2">
+            <a:blip r:embed="rId4">
               <a:extLst>
                 <a:ext uri="{28A0092B-C50C-407E-A947-70E740481C1C}">
                   <a14:useLocalDpi xmlns:a14="http://schemas.microsoft.com/office/drawing/2010/main" val="0"/>
@@ -4431,7 +4882,7 @@
         </p:pic>
         <p:sp>
           <p:nvSpPr>
-            <p:cNvPr id="10" name="TextBox 9"/>
+            <p:cNvPr id="66" name="TextBox 65"/>
             <p:cNvSpPr txBox="1"/>
             <p:nvPr/>
           </p:nvSpPr>
@@ -4468,7 +4919,7 @@
         </p:nvGrpSpPr>
         <p:grpSpPr>
           <a:xfrm>
-            <a:off x="19338336" y="11218290"/>
+            <a:off x="2877603" y="21819442"/>
             <a:ext cx="12505576" cy="7827819"/>
             <a:chOff x="20125478" y="27188234"/>
             <a:chExt cx="12505576" cy="7827819"/>
@@ -4483,7 +4934,7 @@
             <p:nvPr/>
           </p:nvPicPr>
           <p:blipFill>
-            <a:blip r:embed="rId3">
+            <a:blip r:embed="rId5">
               <a:extLst>
                 <a:ext uri="{28A0092B-C50C-407E-A947-70E740481C1C}">
                   <a14:useLocalDpi xmlns:a14="http://schemas.microsoft.com/office/drawing/2010/main" val="0"/>
@@ -4535,82 +4986,310 @@
           </p:txBody>
         </p:sp>
       </p:grpSp>
-      <p:sp>
-        <p:nvSpPr>
-          <p:cNvPr id="13" name="TextBox 12"/>
-          <p:cNvSpPr txBox="1"/>
-          <p:nvPr/>
-        </p:nvSpPr>
-        <p:spPr>
-          <a:xfrm>
-            <a:off x="713852" y="9231423"/>
-            <a:ext cx="13970194" cy="1384995"/>
-          </a:xfrm>
-          <a:prstGeom prst="rect">
-            <a:avLst/>
-          </a:prstGeom>
-          <a:noFill/>
-        </p:spPr>
-        <p:txBody>
-          <a:bodyPr wrap="square" rtlCol="0">
-            <a:spAutoFit/>
-          </a:bodyPr>
-          <a:lstStyle/>
-          <a:p>
-            <a:r>
-              <a:rPr lang="en-US" sz="3600" b="1" dirty="0" smtClean="0"/>
-              <a:t>Design Decisions</a:t>
-            </a:r>
-          </a:p>
-          <a:p>
-            <a:r>
-              <a:rPr lang="en-US" sz="2400" dirty="0" smtClean="0"/>
-              <a:t>Above is an image of the login screen.  We decided to use a chalk-type font to be cohesive with our note taking theme.  It is a very simple user interface, however uses modern transitions from one screen to another.</a:t>
-            </a:r>
-            <a:endParaRPr lang="en-US" sz="2400" dirty="0"/>
-          </a:p>
-        </p:txBody>
-      </p:sp>
-      <p:sp>
-        <p:nvSpPr>
-          <p:cNvPr id="14" name="TextBox 13"/>
-          <p:cNvSpPr txBox="1"/>
-          <p:nvPr/>
-        </p:nvSpPr>
-        <p:spPr>
-          <a:xfrm>
-            <a:off x="31073624" y="43306424"/>
-            <a:ext cx="1844776" cy="584776"/>
-          </a:xfrm>
-          <a:prstGeom prst="rect">
-            <a:avLst/>
-          </a:prstGeom>
-          <a:noFill/>
-        </p:spPr>
-        <p:txBody>
-          <a:bodyPr wrap="none" rtlCol="0">
-            <a:spAutoFit/>
-          </a:bodyPr>
-          <a:lstStyle/>
-          <a:p>
-            <a:r>
-              <a:rPr lang="en-US" sz="3200" dirty="0" smtClean="0"/>
-              <a:t>Team R17</a:t>
-            </a:r>
-            <a:endParaRPr lang="en-US" sz="3200" dirty="0"/>
-          </a:p>
-        </p:txBody>
-      </p:sp>
       <p:pic>
         <p:nvPicPr>
-          <p:cNvPr id="57" name="Picture 56" descr="Screen Shot 2014-12-07 at 4.53.10 PM.png"/>
+          <p:cNvPr id="25" name="Picture 24"/>
           <p:cNvPicPr>
             <a:picLocks noChangeAspect="1"/>
           </p:cNvPicPr>
           <p:nvPr/>
         </p:nvPicPr>
         <p:blipFill>
-          <a:blip r:embed="rId4">
+          <a:blip r:embed="rId6"/>
+          <a:stretch>
+            <a:fillRect/>
+          </a:stretch>
+        </p:blipFill>
+        <p:spPr>
+          <a:xfrm>
+            <a:off x="2611296" y="29834933"/>
+            <a:ext cx="12733389" cy="6182732"/>
+          </a:xfrm>
+          <a:prstGeom prst="rect">
+            <a:avLst/>
+          </a:prstGeom>
+        </p:spPr>
+      </p:pic>
+      <p:sp>
+        <p:nvSpPr>
+          <p:cNvPr id="68" name="TextBox 67"/>
+          <p:cNvSpPr txBox="1"/>
+          <p:nvPr/>
+        </p:nvSpPr>
+        <p:spPr>
+          <a:xfrm>
+            <a:off x="11818549" y="36073547"/>
+            <a:ext cx="3564630" cy="584775"/>
+          </a:xfrm>
+          <a:prstGeom prst="rect">
+            <a:avLst/>
+          </a:prstGeom>
+          <a:noFill/>
+        </p:spPr>
+        <p:txBody>
+          <a:bodyPr wrap="none" rtlCol="0">
+            <a:spAutoFit/>
+          </a:bodyPr>
+          <a:lstStyle/>
+          <a:p>
+            <a:r>
+              <a:rPr lang="en-US" sz="3200" dirty="0" smtClean="0"/>
+              <a:t>Adding Subthoughts</a:t>
+            </a:r>
+            <a:endParaRPr lang="en-US" sz="3200" dirty="0"/>
+          </a:p>
+        </p:txBody>
+      </p:sp>
+      <p:sp>
+        <p:nvSpPr>
+          <p:cNvPr id="70" name="TextBox 69"/>
+          <p:cNvSpPr txBox="1"/>
+          <p:nvPr/>
+        </p:nvSpPr>
+        <p:spPr>
+          <a:xfrm>
+            <a:off x="17247310" y="4827190"/>
+            <a:ext cx="14918875" cy="20043949"/>
+          </a:xfrm>
+          <a:prstGeom prst="rect">
+            <a:avLst/>
+          </a:prstGeom>
+          <a:solidFill>
+            <a:schemeClr val="bg1"/>
+          </a:solidFill>
+          <a:ln w="107950">
+            <a:solidFill>
+              <a:srgbClr val="0070C0"/>
+            </a:solidFill>
+          </a:ln>
+        </p:spPr>
+        <p:txBody>
+          <a:bodyPr wrap="square" tIns="548640" bIns="0" rtlCol="0">
+            <a:spAutoFit/>
+          </a:bodyPr>
+          <a:lstStyle/>
+          <a:p>
+            <a:r>
+              <a:rPr lang="en-US" sz="3600" i="1" dirty="0" smtClean="0"/>
+              <a:t>As we developed OpenNote, we focused on a few key use cases</a:t>
+            </a:r>
+            <a:endParaRPr lang="en-US" sz="3600" dirty="0" smtClean="0"/>
+          </a:p>
+          <a:p>
+            <a:r>
+              <a:rPr lang="en-US" sz="3600" b="1" dirty="0" smtClean="0"/>
+              <a:t>Creating an Account</a:t>
+            </a:r>
+            <a:endParaRPr lang="en-US" sz="3600" b="1" dirty="0"/>
+          </a:p>
+          <a:p>
+            <a:r>
+              <a:rPr lang="en-US" sz="2800" dirty="0" smtClean="0"/>
+              <a:t>OpenNote makes it extremely easy to register new accounts. We ask each user to provide their basic contact info such as their name and email, and then we ask what university they attend. Since OpenNote is collaborative note taking for classes, we have to know what university the user attends so we know what classes they are able to join. </a:t>
+            </a:r>
+          </a:p>
+          <a:p>
+            <a:endParaRPr lang="en-US" sz="1100" dirty="0"/>
+          </a:p>
+          <a:p>
+            <a:r>
+              <a:rPr lang="en-US" sz="3600" b="1" dirty="0" smtClean="0"/>
+              <a:t>Creating Classes</a:t>
+            </a:r>
+          </a:p>
+          <a:p>
+            <a:r>
+              <a:rPr lang="en-US" sz="2800" dirty="0" smtClean="0"/>
+              <a:t>Anyone can create a new class for others to join. Creating a new class is easy, the user simply has to supply a class name, the instructor name, and then the term and year the class is offered. After creating a class, other students attending the same university will be able to search for and join your class! </a:t>
+            </a:r>
+          </a:p>
+          <a:p>
+            <a:endParaRPr lang="en-US" sz="1100" dirty="0"/>
+          </a:p>
+          <a:p>
+            <a:r>
+              <a:rPr lang="en-US" sz="3600" b="1" dirty="0" smtClean="0"/>
+              <a:t>Taking Notes</a:t>
+            </a:r>
+          </a:p>
+          <a:p>
+            <a:r>
+              <a:rPr lang="en-US" sz="2800" dirty="0" smtClean="0"/>
+              <a:t>Great note-taking is at the heart of OpenNote. First, a student will select which class they wish to take notes for. If they are already enrolled in classes, it will load the first class automatically. Secondly, they can make a new note sheet, this sheet can be divided by lecture date, textbook chapter, or whatever the user would like.  </a:t>
+            </a:r>
+          </a:p>
+          <a:p>
+            <a:endParaRPr lang="en-US" sz="2800" b="1" dirty="0" smtClean="0"/>
+          </a:p>
+          <a:p>
+            <a:r>
+              <a:rPr lang="en-US" sz="2800" dirty="0" smtClean="0"/>
+              <a:t>Once a note sheet has either been selected or created, the user can begin typing notes. We give them a full-blown HTML text editor to create rich formatted notes on the fly.  We automatically separate the notes you type into thoughts. These thoughts are what is shared with your classmates amongst many other things. You always go back and modify existing thoughts, merge them together, split them apart, or delete them.</a:t>
+            </a:r>
+          </a:p>
+          <a:p>
+            <a:endParaRPr lang="en-US" sz="1100" dirty="0"/>
+          </a:p>
+          <a:p>
+            <a:r>
+              <a:rPr lang="en-US" sz="3600" b="1" dirty="0" smtClean="0"/>
+              <a:t>Sharing</a:t>
+            </a:r>
+          </a:p>
+          <a:p>
+            <a:r>
+              <a:rPr lang="en-US" sz="2800" dirty="0" smtClean="0"/>
+              <a:t>We have made it as easy as possible to share notes with classmates! When you post a thought to your note sheet, it becomes available  for classmates to add to their own note sheets. Similarly, you can use the left and right arrows surrounding each of your thoughts to browse notes classmates have submitted before and after you had that thought. We also have the ability to report and remove abusive thoughts.</a:t>
+            </a:r>
+          </a:p>
+          <a:p>
+            <a:endParaRPr lang="en-US" sz="1050" dirty="0"/>
+          </a:p>
+          <a:p>
+            <a:r>
+              <a:rPr lang="en-US" sz="3600" b="1" dirty="0" smtClean="0"/>
+              <a:t>Studying</a:t>
+            </a:r>
+          </a:p>
+          <a:p>
+            <a:r>
+              <a:rPr lang="en-US" sz="2800" dirty="0" smtClean="0"/>
+              <a:t>We have two major things developed to help you study. The first is the ability to turn any thought into a flashcard. Simply click the lightning icon and it will flip your thought over and allow you to write a hint for the thought content. Flip back and forth and make memorization a breeze!</a:t>
+            </a:r>
+          </a:p>
+          <a:p>
+            <a:endParaRPr lang="en-US" sz="2800" dirty="0"/>
+          </a:p>
+          <a:p>
+            <a:r>
+              <a:rPr lang="en-US" sz="2800" dirty="0" smtClean="0"/>
+              <a:t>Secondly, we made it easy to favorite your most helpful thoughts. Easily print any thought that has been “starred” to create printable study guides any time.</a:t>
+            </a:r>
+          </a:p>
+          <a:p>
+            <a:endParaRPr lang="en-US" sz="1100" b="1" dirty="0"/>
+          </a:p>
+          <a:p>
+            <a:r>
+              <a:rPr lang="en-US" sz="3600" b="1" dirty="0" smtClean="0"/>
+              <a:t>Administer Classes</a:t>
+            </a:r>
+          </a:p>
+          <a:p>
+            <a:r>
+              <a:rPr lang="en-US" sz="2800" dirty="0" smtClean="0"/>
+              <a:t>If you created a class at your university, you are the administrator of it. As the administrator, you have access to see everyone in the class and all the thoughts that have been created in that class. You can easily remove thoughts or users as needed. One handy feature is to see reported thoughts at the top of the page to make removal even easier.</a:t>
+            </a:r>
+          </a:p>
+        </p:txBody>
+      </p:sp>
+      <p:sp>
+        <p:nvSpPr>
+          <p:cNvPr id="69" name="Rounded Rectangle 68"/>
+          <p:cNvSpPr/>
+          <p:nvPr/>
+        </p:nvSpPr>
+        <p:spPr>
+          <a:xfrm>
+            <a:off x="17877224" y="4142826"/>
+            <a:ext cx="7805057" cy="962848"/>
+          </a:xfrm>
+          <a:prstGeom prst="roundRect">
+            <a:avLst/>
+          </a:prstGeom>
+        </p:spPr>
+        <p:style>
+          <a:lnRef idx="1">
+            <a:schemeClr val="accent1"/>
+          </a:lnRef>
+          <a:fillRef idx="3">
+            <a:schemeClr val="accent1"/>
+          </a:fillRef>
+          <a:effectRef idx="2">
+            <a:schemeClr val="accent1"/>
+          </a:effectRef>
+          <a:fontRef idx="minor">
+            <a:schemeClr val="lt1"/>
+          </a:fontRef>
+        </p:style>
+        <p:txBody>
+          <a:bodyPr rtlCol="0" anchor="ctr"/>
+          <a:lstStyle/>
+          <a:p>
+            <a:pPr algn="ctr"/>
+            <a:r>
+              <a:rPr lang="en-US" sz="6000" dirty="0" smtClean="0"/>
+              <a:t>Use Cases</a:t>
+            </a:r>
+            <a:endParaRPr lang="en-US" sz="6000" dirty="0"/>
+          </a:p>
+        </p:txBody>
+      </p:sp>
+      <p:sp>
+        <p:nvSpPr>
+          <p:cNvPr id="71" name="TextBox 70"/>
+          <p:cNvSpPr txBox="1"/>
+          <p:nvPr/>
+        </p:nvSpPr>
+        <p:spPr>
+          <a:xfrm>
+            <a:off x="1583866" y="38145596"/>
+            <a:ext cx="14918875" cy="5339923"/>
+          </a:xfrm>
+          <a:prstGeom prst="rect">
+            <a:avLst/>
+          </a:prstGeom>
+          <a:solidFill>
+            <a:schemeClr val="bg1"/>
+          </a:solidFill>
+          <a:ln w="107950">
+            <a:solidFill>
+              <a:srgbClr val="0070C0"/>
+            </a:solidFill>
+          </a:ln>
+        </p:spPr>
+        <p:txBody>
+          <a:bodyPr wrap="square" tIns="548640" rIns="7955280" rtlCol="0">
+            <a:spAutoFit/>
+          </a:bodyPr>
+          <a:lstStyle/>
+          <a:p>
+            <a:r>
+              <a:rPr lang="en-US" sz="2800" dirty="0"/>
+              <a:t>Coming into this project, none of our group members knew too much about </a:t>
+            </a:r>
+            <a:r>
+              <a:rPr lang="en-US" sz="2800" dirty="0" smtClean="0"/>
+              <a:t>each other</a:t>
+            </a:r>
+            <a:r>
+              <a:rPr lang="en-US" sz="2800" dirty="0"/>
+              <a:t>.  But having spent a whole semester together we have learned a lot, and grown to become very good friends.  We learned a great deal about the process involved in making an app, as well as how important communication is.  It isn’t always opportune to meet for everyone so it is extremely important to split up work and collaborate </a:t>
+            </a:r>
+            <a:r>
+              <a:rPr lang="en-US" sz="2800" dirty="0" smtClean="0"/>
+              <a:t>often</a:t>
+            </a:r>
+            <a:endParaRPr lang="en-US" sz="2800" dirty="0"/>
+          </a:p>
+          <a:p>
+            <a:r>
+              <a:rPr lang="en-US" sz="2800" i="1" dirty="0" smtClean="0"/>
+              <a:t> Left to Right : Shaun VW, Alec P, Matt S, Kim B</a:t>
+            </a:r>
+          </a:p>
+        </p:txBody>
+      </p:sp>
+      <p:pic>
+        <p:nvPicPr>
+          <p:cNvPr id="9" name="Picture 8" descr="Screen Shot 2014-12-07 at 11.56.51 PM.png"/>
+          <p:cNvPicPr>
+            <a:picLocks noChangeAspect="1"/>
+          </p:cNvPicPr>
+          <p:nvPr/>
+        </p:nvPicPr>
+        <p:blipFill>
+          <a:blip r:embed="rId7">
             <a:extLst>
               <a:ext uri="{28A0092B-C50C-407E-A947-70E740481C1C}">
                 <a14:useLocalDpi xmlns:a14="http://schemas.microsoft.com/office/drawing/2010/main" val="0"/>
@@ -4623,8 +5302,8 @@
         </p:blipFill>
         <p:spPr>
           <a:xfrm>
-            <a:off x="713854" y="21214682"/>
-            <a:ext cx="6238040" cy="7380472"/>
+            <a:off x="9469232" y="38357655"/>
+            <a:ext cx="6819513" cy="4948769"/>
           </a:xfrm>
           <a:prstGeom prst="rect">
             <a:avLst/>
@@ -4633,209 +5312,309 @@
       </p:pic>
       <p:sp>
         <p:nvSpPr>
-          <p:cNvPr id="58" name="TextBox 57"/>
+          <p:cNvPr id="72" name="Rounded Rectangle 71"/>
+          <p:cNvSpPr/>
+          <p:nvPr/>
+        </p:nvSpPr>
+        <p:spPr>
+          <a:xfrm>
+            <a:off x="1844607" y="37512126"/>
+            <a:ext cx="7805057" cy="962848"/>
+          </a:xfrm>
+          <a:prstGeom prst="roundRect">
+            <a:avLst/>
+          </a:prstGeom>
+        </p:spPr>
+        <p:style>
+          <a:lnRef idx="1">
+            <a:schemeClr val="accent1"/>
+          </a:lnRef>
+          <a:fillRef idx="3">
+            <a:schemeClr val="accent1"/>
+          </a:fillRef>
+          <a:effectRef idx="2">
+            <a:schemeClr val="accent1"/>
+          </a:effectRef>
+          <a:fontRef idx="minor">
+            <a:schemeClr val="lt1"/>
+          </a:fontRef>
+        </p:style>
+        <p:txBody>
+          <a:bodyPr rtlCol="0" anchor="ctr"/>
+          <a:lstStyle/>
+          <a:p>
+            <a:pPr algn="ctr"/>
+            <a:r>
+              <a:rPr lang="en-US" sz="6000" dirty="0" smtClean="0"/>
+              <a:t>Team Info</a:t>
+            </a:r>
+            <a:endParaRPr lang="en-US" sz="6000" dirty="0"/>
+          </a:p>
+        </p:txBody>
+      </p:sp>
+      <p:sp>
+        <p:nvSpPr>
+          <p:cNvPr id="73" name="TextBox 72"/>
           <p:cNvSpPr txBox="1"/>
           <p:nvPr/>
         </p:nvSpPr>
         <p:spPr>
           <a:xfrm>
-            <a:off x="19202396" y="6293536"/>
-            <a:ext cx="13428658" cy="2862322"/>
+            <a:off x="17279518" y="25595094"/>
+            <a:ext cx="14918875" cy="4909036"/>
           </a:xfrm>
           <a:prstGeom prst="rect">
             <a:avLst/>
           </a:prstGeom>
-          <a:noFill/>
-        </p:spPr>
-        <p:txBody>
-          <a:bodyPr wrap="square" rtlCol="0">
+          <a:solidFill>
+            <a:schemeClr val="bg1"/>
+          </a:solidFill>
+          <a:ln w="107950">
+            <a:solidFill>
+              <a:srgbClr val="0070C0"/>
+            </a:solidFill>
+          </a:ln>
+        </p:spPr>
+        <p:txBody>
+          <a:bodyPr wrap="square" tIns="548640" rIns="822960" rtlCol="0">
             <a:spAutoFit/>
           </a:bodyPr>
           <a:lstStyle/>
           <a:p>
             <a:r>
-              <a:rPr lang="en-US" sz="3600" b="1" dirty="0" smtClean="0"/>
-              <a:t>Use-Cases</a:t>
-            </a:r>
-          </a:p>
-          <a:p>
-            <a:r>
-              <a:rPr lang="en-US" sz="2400" dirty="0" smtClean="0"/>
-              <a:t>The app is geared towards the student.  The student has the ability to take notes, and share them collaboratively with other classmates.  Once a note is created, the student can compare their notes with other classmates in order to fill in a spot they missed, or to insert a better note.  The student can also split their notes into different portions, edit their note portions, delete their note portions, or combine their note portions.  As a class creator, you have the ability to remove inappropriate users from your class, or to change the information pertaining to the class  </a:t>
-            </a:r>
-            <a:endParaRPr lang="en-US" sz="2400" dirty="0"/>
-          </a:p>
-        </p:txBody>
-      </p:sp>
-      <p:sp>
-        <p:nvSpPr>
-          <p:cNvPr id="59" name="TextBox 58"/>
+              <a:rPr lang="en-US" sz="2800" dirty="0" smtClean="0"/>
+              <a:t>In terms of overall site flow, we looked at several modern websites and realized that several of the sites simply load different parts of the page dynamically instead of making the user go to a bunch of different pages for different actions. We only have one index.html page and all the user actions either take place on the right hand side of the screen where notes are or pop up as a modal. </a:t>
+            </a:r>
+            <a:br>
+              <a:rPr lang="en-US" sz="2800" dirty="0" smtClean="0"/>
+            </a:br>
+            <a:endParaRPr lang="en-US" sz="2800" dirty="0" smtClean="0"/>
+          </a:p>
+          <a:p>
+            <a:r>
+              <a:rPr lang="en-US" sz="2800" dirty="0" smtClean="0"/>
+              <a:t>Due to the vey asynchronous nature of collaborative note taking, instead of using a traditional server, we used </a:t>
+            </a:r>
+            <a:r>
+              <a:rPr lang="en-US" sz="2800" smtClean="0"/>
+              <a:t>the JavaScript </a:t>
+            </a:r>
+            <a:r>
+              <a:rPr lang="en-US" sz="2800" dirty="0" smtClean="0"/>
+              <a:t>library Firebase to store and load all data. This worked out amazingly well because the content consistently loads and updates itself and the HTML in the background.  </a:t>
+            </a:r>
+            <a:endParaRPr lang="en-US" sz="2800" dirty="0" smtClean="0"/>
+          </a:p>
+        </p:txBody>
+      </p:sp>
+      <p:sp>
+        <p:nvSpPr>
+          <p:cNvPr id="74" name="Rounded Rectangle 73"/>
+          <p:cNvSpPr/>
+          <p:nvPr/>
+        </p:nvSpPr>
+        <p:spPr>
+          <a:xfrm>
+            <a:off x="17839846" y="25090307"/>
+            <a:ext cx="7805057" cy="962848"/>
+          </a:xfrm>
+          <a:prstGeom prst="roundRect">
+            <a:avLst/>
+          </a:prstGeom>
+        </p:spPr>
+        <p:style>
+          <a:lnRef idx="1">
+            <a:schemeClr val="accent1"/>
+          </a:lnRef>
+          <a:fillRef idx="3">
+            <a:schemeClr val="accent1"/>
+          </a:fillRef>
+          <a:effectRef idx="2">
+            <a:schemeClr val="accent1"/>
+          </a:effectRef>
+          <a:fontRef idx="minor">
+            <a:schemeClr val="lt1"/>
+          </a:fontRef>
+        </p:style>
+        <p:txBody>
+          <a:bodyPr rtlCol="0" anchor="ctr"/>
+          <a:lstStyle/>
+          <a:p>
+            <a:pPr algn="ctr"/>
+            <a:r>
+              <a:rPr lang="en-US" sz="6000" dirty="0" smtClean="0"/>
+              <a:t>Design Decisions</a:t>
+            </a:r>
+            <a:endParaRPr lang="en-US" sz="6000" dirty="0"/>
+          </a:p>
+        </p:txBody>
+      </p:sp>
+      <p:sp>
+        <p:nvSpPr>
+          <p:cNvPr id="75" name="TextBox 74"/>
           <p:cNvSpPr txBox="1"/>
           <p:nvPr/>
         </p:nvSpPr>
         <p:spPr>
           <a:xfrm>
-            <a:off x="713854" y="6084631"/>
-            <a:ext cx="13970192" cy="4185762"/>
+            <a:off x="17279518" y="31687908"/>
+            <a:ext cx="14918875" cy="11803231"/>
           </a:xfrm>
           <a:prstGeom prst="rect">
             <a:avLst/>
           </a:prstGeom>
-          <a:noFill/>
-        </p:spPr>
-        <p:txBody>
-          <a:bodyPr wrap="square" rtlCol="0">
+          <a:solidFill>
+            <a:schemeClr val="bg1"/>
+          </a:solidFill>
+          <a:ln w="107950">
+            <a:solidFill>
+              <a:srgbClr val="0070C0"/>
+            </a:solidFill>
+          </a:ln>
+        </p:spPr>
+        <p:txBody>
+          <a:bodyPr wrap="square" tIns="548640" rIns="822960" rtlCol="0">
             <a:spAutoFit/>
           </a:bodyPr>
           <a:lstStyle/>
           <a:p>
             <a:r>
-              <a:rPr lang="en-US" sz="3600" b="1" dirty="0" smtClean="0"/>
-              <a:t>Actors</a:t>
-            </a:r>
-          </a:p>
-          <a:p>
-            <a:r>
-              <a:rPr lang="en-US" sz="2400" dirty="0" err="1" smtClean="0"/>
-              <a:t>OpenNote</a:t>
-            </a:r>
-            <a:r>
-              <a:rPr lang="en-US" sz="2400" dirty="0" smtClean="0"/>
-              <a:t> consists of three different types of actors:</a:t>
-            </a:r>
-          </a:p>
-          <a:p>
-            <a:r>
-              <a:rPr lang="en-US" sz="2400" dirty="0" smtClean="0"/>
-              <a:t>	Student – Every user that uses the app to take notes is considered a student.  They are the users that use the app to keep their </a:t>
-            </a:r>
-            <a:r>
-              <a:rPr lang="en-US" sz="2400" dirty="0" err="1" smtClean="0"/>
-              <a:t>ntoes</a:t>
-            </a:r>
-            <a:r>
-              <a:rPr lang="en-US" sz="2400" dirty="0" smtClean="0"/>
-              <a:t> organized and work together collaboratively with other students to create the best possible notes.</a:t>
-            </a:r>
-          </a:p>
-          <a:p>
-            <a:r>
-              <a:rPr lang="en-US" sz="2400" dirty="0" smtClean="0"/>
-              <a:t>	</a:t>
-            </a:r>
-            <a:r>
-              <a:rPr lang="en-US" sz="2400" dirty="0" smtClean="0"/>
-              <a:t>Class </a:t>
-            </a:r>
-            <a:r>
-              <a:rPr lang="en-US" sz="2400" dirty="0" smtClean="0"/>
-              <a:t>Creator – The user that has originally created the class.  This user is able to remove users from their class, as well as delete the class they created if they like.</a:t>
-            </a:r>
-          </a:p>
-          <a:p>
-            <a:endParaRPr lang="en-US" dirty="0"/>
-          </a:p>
-        </p:txBody>
-      </p:sp>
-      <p:sp>
-        <p:nvSpPr>
-          <p:cNvPr id="60" name="TextBox 59"/>
-          <p:cNvSpPr txBox="1"/>
+              <a:rPr lang="en-US" sz="2800" dirty="0"/>
+              <a:t>The user interface for the student and class creator are one in the same.  The only difference is that the class creator has more power within the app.  They can manage their classes by removing users or changing the class specs/information</a:t>
+            </a:r>
+            <a:r>
+              <a:rPr lang="en-US" sz="2800" dirty="0" smtClean="0"/>
+              <a:t>. Below is a list of actions that each user role is allowed to do.</a:t>
+            </a:r>
+          </a:p>
+          <a:p>
+            <a:endParaRPr lang="en-US" sz="2800" dirty="0"/>
+          </a:p>
+          <a:p>
+            <a:endParaRPr lang="en-US" sz="2800" dirty="0" smtClean="0"/>
+          </a:p>
+          <a:p>
+            <a:endParaRPr lang="en-US" sz="2800" dirty="0"/>
+          </a:p>
+          <a:p>
+            <a:endParaRPr lang="en-US" sz="2800" dirty="0" smtClean="0"/>
+          </a:p>
+          <a:p>
+            <a:endParaRPr lang="en-US" sz="2800" dirty="0"/>
+          </a:p>
+          <a:p>
+            <a:endParaRPr lang="en-US" sz="2800" dirty="0" smtClean="0"/>
+          </a:p>
+          <a:p>
+            <a:endParaRPr lang="en-US" sz="2800" dirty="0"/>
+          </a:p>
+          <a:p>
+            <a:endParaRPr lang="en-US" sz="2800" dirty="0" smtClean="0"/>
+          </a:p>
+          <a:p>
+            <a:endParaRPr lang="en-US" sz="2800" dirty="0"/>
+          </a:p>
+          <a:p>
+            <a:endParaRPr lang="en-US" sz="2800" dirty="0" smtClean="0"/>
+          </a:p>
+          <a:p>
+            <a:endParaRPr lang="en-US" sz="2800" dirty="0"/>
+          </a:p>
+          <a:p>
+            <a:endParaRPr lang="en-US" sz="2800" dirty="0" smtClean="0"/>
+          </a:p>
+          <a:p>
+            <a:endParaRPr lang="en-US" sz="2800" dirty="0"/>
+          </a:p>
+          <a:p>
+            <a:endParaRPr lang="en-US" sz="2800" dirty="0" smtClean="0"/>
+          </a:p>
+          <a:p>
+            <a:endParaRPr lang="en-US" sz="2800" dirty="0" smtClean="0"/>
+          </a:p>
+          <a:p>
+            <a:endParaRPr lang="en-US" sz="2800" dirty="0"/>
+          </a:p>
+          <a:p>
+            <a:endParaRPr lang="en-US" sz="2800" dirty="0" smtClean="0"/>
+          </a:p>
+          <a:p>
+            <a:endParaRPr lang="en-US" sz="2800" dirty="0"/>
+          </a:p>
+          <a:p>
+            <a:endParaRPr lang="en-US" sz="2800" dirty="0" smtClean="0"/>
+          </a:p>
+          <a:p>
+            <a:endParaRPr lang="en-US" sz="2800" dirty="0"/>
+          </a:p>
+          <a:p>
+            <a:endParaRPr lang="en-US" sz="2800" dirty="0"/>
+          </a:p>
+          <a:p>
+            <a:endParaRPr lang="en-US" sz="2800" dirty="0" smtClean="0"/>
+          </a:p>
+        </p:txBody>
+      </p:sp>
+      <p:sp>
+        <p:nvSpPr>
+          <p:cNvPr id="76" name="Rounded Rectangle 75"/>
+          <p:cNvSpPr/>
           <p:nvPr/>
         </p:nvSpPr>
         <p:spPr>
           <a:xfrm>
-            <a:off x="9629731" y="21214682"/>
-            <a:ext cx="13141884" cy="2492990"/>
-          </a:xfrm>
-          <a:prstGeom prst="rect">
+            <a:off x="17696835" y="31210487"/>
+            <a:ext cx="7805057" cy="962848"/>
+          </a:xfrm>
+          <a:prstGeom prst="roundRect">
             <a:avLst/>
           </a:prstGeom>
-          <a:noFill/>
-        </p:spPr>
-        <p:txBody>
-          <a:bodyPr wrap="square" rtlCol="0">
-            <a:spAutoFit/>
-          </a:bodyPr>
+        </p:spPr>
+        <p:style>
+          <a:lnRef idx="1">
+            <a:schemeClr val="accent1"/>
+          </a:lnRef>
+          <a:fillRef idx="3">
+            <a:schemeClr val="accent1"/>
+          </a:fillRef>
+          <a:effectRef idx="2">
+            <a:schemeClr val="accent1"/>
+          </a:effectRef>
+          <a:fontRef idx="minor">
+            <a:schemeClr val="lt1"/>
+          </a:fontRef>
+        </p:style>
+        <p:txBody>
+          <a:bodyPr rtlCol="0" anchor="ctr"/>
           <a:lstStyle/>
           <a:p>
-            <a:r>
-              <a:rPr lang="en-US" sz="3600" b="1" dirty="0" smtClean="0"/>
-              <a:t>Team Info</a:t>
-            </a:r>
-          </a:p>
-          <a:p>
-            <a:r>
-              <a:rPr lang="en-US" sz="2400" dirty="0" smtClean="0"/>
-              <a:t>Coming into this project, none of our group members knew too much about </a:t>
-            </a:r>
-            <a:r>
-              <a:rPr lang="en-US" sz="2400" dirty="0" err="1" smtClean="0"/>
-              <a:t>eachother</a:t>
-            </a:r>
-            <a:r>
-              <a:rPr lang="en-US" sz="2400" dirty="0" smtClean="0"/>
-              <a:t>.  But having spent a whole semester together we have learned a lot, and grown to become very good friends.  We learned a great deal about the process involved in making an app, as well as how important communication is.  It isn’t always opportune to meet for everyone so it is extremely important to split up work and collaborate often.</a:t>
-            </a:r>
-            <a:endParaRPr lang="en-US" sz="2400" dirty="0"/>
-          </a:p>
-        </p:txBody>
-      </p:sp>
-      <p:sp>
-        <p:nvSpPr>
-          <p:cNvPr id="61" name="TextBox 60"/>
-          <p:cNvSpPr txBox="1"/>
-          <p:nvPr/>
-        </p:nvSpPr>
-        <p:spPr>
-          <a:xfrm>
-            <a:off x="19583942" y="37137386"/>
-            <a:ext cx="12259970" cy="1415772"/>
-          </a:xfrm>
-          <a:prstGeom prst="rect">
-            <a:avLst/>
-          </a:prstGeom>
-          <a:noFill/>
-        </p:spPr>
-        <p:txBody>
-          <a:bodyPr wrap="square" rtlCol="0">
-            <a:spAutoFit/>
-          </a:bodyPr>
-          <a:lstStyle/>
-          <a:p>
             <a:pPr algn="ctr"/>
             <a:r>
-              <a:rPr lang="en-US" dirty="0" smtClean="0"/>
-              <a:t>Insert team picture</a:t>
-            </a:r>
-            <a:endParaRPr lang="en-US" dirty="0"/>
+              <a:rPr lang="en-US" sz="6000" dirty="0" smtClean="0"/>
+              <a:t>User Interfaces</a:t>
+            </a:r>
+            <a:endParaRPr lang="en-US" sz="6000" dirty="0"/>
           </a:p>
         </p:txBody>
       </p:sp>
       <p:pic>
         <p:nvPicPr>
-          <p:cNvPr id="9" name="Picture 8" descr="Screen Shot 2014-12-07 at 11.56.51 PM.png"/>
+          <p:cNvPr id="26" name="Picture 25"/>
           <p:cNvPicPr>
             <a:picLocks noChangeAspect="1"/>
           </p:cNvPicPr>
           <p:nvPr/>
         </p:nvPicPr>
         <p:blipFill>
-          <a:blip r:embed="rId5">
-            <a:extLst>
-              <a:ext uri="{28A0092B-C50C-407E-A947-70E740481C1C}">
-                <a14:useLocalDpi xmlns:a14="http://schemas.microsoft.com/office/drawing/2010/main" val="0"/>
-              </a:ext>
-            </a:extLst>
-          </a:blip>
+          <a:blip r:embed="rId8"/>
           <a:stretch>
             <a:fillRect/>
           </a:stretch>
         </p:blipFill>
         <p:spPr>
           <a:xfrm>
-            <a:off x="18342907" y="25385606"/>
-            <a:ext cx="7962900" cy="5778500"/>
+            <a:off x="20601322" y="33523564"/>
+            <a:ext cx="8368499" cy="9877308"/>
           </a:xfrm>
           <a:prstGeom prst="rect">
             <a:avLst/>

</xml_diff>